<commit_message>
Updated Physics Slides to latest version
</commit_message>
<xml_diff>
--- a/Physics Course Games Academy July 2015.pptx
+++ b/Physics Course Games Academy July 2015.pptx
@@ -26,6 +26,15 @@
     <p:sldId id="271" r:id="rId21"/>
     <p:sldId id="272" r:id="rId22"/>
     <p:sldId id="273" r:id="rId23"/>
+    <p:sldId id="274" r:id="rId24"/>
+    <p:sldId id="275" r:id="rId25"/>
+    <p:sldId id="276" r:id="rId26"/>
+    <p:sldId id="277" r:id="rId27"/>
+    <p:sldId id="278" r:id="rId28"/>
+    <p:sldId id="279" r:id="rId29"/>
+    <p:sldId id="280" r:id="rId30"/>
+    <p:sldId id="281" r:id="rId31"/>
+    <p:sldId id="282" r:id="rId32"/>
   </p:sldIdLst>
   <p:sldSz cy="5143500" cx="9144000"/>
   <p:notesSz cx="6858000" cy="9144000"/>
@@ -995,7 +1004,7 @@
   <p:cSld>
     <p:spTree>
       <p:nvGrpSpPr>
-        <p:cNvPr id="118" name="Shape 118"/>
+        <p:cNvPr id="119" name="Shape 119"/>
         <p:cNvGrpSpPr/>
         <p:nvPr/>
       </p:nvGrpSpPr>
@@ -1009,7 +1018,7 @@
       </p:grpSpPr>
       <p:sp>
         <p:nvSpPr>
-          <p:cNvPr id="119" name="Shape 119"/>
+          <p:cNvPr id="120" name="Shape 120"/>
           <p:cNvSpPr/>
           <p:nvPr>
             <p:ph idx="2" type="sldImg"/>
@@ -1053,7 +1062,7 @@
       </p:sp>
       <p:sp>
         <p:nvSpPr>
-          <p:cNvPr id="120" name="Shape 120"/>
+          <p:cNvPr id="121" name="Shape 121"/>
           <p:cNvSpPr txBox="1"/>
           <p:nvPr>
             <p:ph idx="1" type="body"/>
@@ -1129,7 +1138,7 @@
   <p:cSld>
     <p:spTree>
       <p:nvGrpSpPr>
-        <p:cNvPr id="124" name="Shape 124"/>
+        <p:cNvPr id="125" name="Shape 125"/>
         <p:cNvGrpSpPr/>
         <p:nvPr/>
       </p:nvGrpSpPr>
@@ -1143,7 +1152,7 @@
       </p:grpSpPr>
       <p:sp>
         <p:nvSpPr>
-          <p:cNvPr id="125" name="Shape 125"/>
+          <p:cNvPr id="126" name="Shape 126"/>
           <p:cNvSpPr/>
           <p:nvPr>
             <p:ph idx="2" type="sldImg"/>
@@ -1187,7 +1196,7 @@
       </p:sp>
       <p:sp>
         <p:nvSpPr>
-          <p:cNvPr id="126" name="Shape 126"/>
+          <p:cNvPr id="127" name="Shape 127"/>
           <p:cNvSpPr txBox="1"/>
           <p:nvPr>
             <p:ph idx="1" type="body"/>
@@ -1234,7 +1243,7 @@
   <p:cSld>
     <p:spTree>
       <p:nvGrpSpPr>
-        <p:cNvPr id="130" name="Shape 130"/>
+        <p:cNvPr id="131" name="Shape 131"/>
         <p:cNvGrpSpPr/>
         <p:nvPr/>
       </p:nvGrpSpPr>
@@ -1248,7 +1257,7 @@
       </p:grpSpPr>
       <p:sp>
         <p:nvSpPr>
-          <p:cNvPr id="131" name="Shape 131"/>
+          <p:cNvPr id="132" name="Shape 132"/>
           <p:cNvSpPr/>
           <p:nvPr>
             <p:ph idx="2" type="sldImg"/>
@@ -1292,7 +1301,7 @@
       </p:sp>
       <p:sp>
         <p:nvSpPr>
-          <p:cNvPr id="132" name="Shape 132"/>
+          <p:cNvPr id="133" name="Shape 133"/>
           <p:cNvSpPr txBox="1"/>
           <p:nvPr>
             <p:ph idx="1" type="body"/>
@@ -1312,6 +1321,23 @@
             <a:noAutofit/>
           </a:bodyPr>
           <a:lstStyle/>
+          <a:p>
+            <a:pPr rtl="0">
+              <a:spcBef>
+                <a:spcPts val="0"/>
+              </a:spcBef>
+              <a:buNone/>
+            </a:pPr>
+            <a:r>
+              <a:rPr lang="en" u="sng">
+                <a:solidFill>
+                  <a:schemeClr val="hlink"/>
+                </a:solidFill>
+                <a:hlinkClick r:id="rId2"/>
+              </a:rPr>
+              <a:t>https://code.google.com/p/jitterphysics/</a:t>
+            </a:r>
+          </a:p>
           <a:p>
             <a:pPr>
               <a:spcBef>
@@ -1339,7 +1365,7 @@
   <p:cSld>
     <p:spTree>
       <p:nvGrpSpPr>
-        <p:cNvPr id="136" name="Shape 136"/>
+        <p:cNvPr id="137" name="Shape 137"/>
         <p:cNvGrpSpPr/>
         <p:nvPr/>
       </p:nvGrpSpPr>
@@ -1353,7 +1379,7 @@
       </p:grpSpPr>
       <p:sp>
         <p:nvSpPr>
-          <p:cNvPr id="137" name="Shape 137"/>
+          <p:cNvPr id="138" name="Shape 138"/>
           <p:cNvSpPr/>
           <p:nvPr>
             <p:ph idx="2" type="sldImg"/>
@@ -1397,7 +1423,7 @@
       </p:sp>
       <p:sp>
         <p:nvSpPr>
-          <p:cNvPr id="138" name="Shape 138"/>
+          <p:cNvPr id="139" name="Shape 139"/>
           <p:cNvSpPr txBox="1"/>
           <p:nvPr>
             <p:ph idx="1" type="body"/>
@@ -1417,6 +1443,23 @@
             <a:noAutofit/>
           </a:bodyPr>
           <a:lstStyle/>
+          <a:p>
+            <a:pPr rtl="0">
+              <a:spcBef>
+                <a:spcPts val="0"/>
+              </a:spcBef>
+              <a:buNone/>
+            </a:pPr>
+            <a:r>
+              <a:rPr lang="en" u="sng">
+                <a:solidFill>
+                  <a:schemeClr val="hlink"/>
+                </a:solidFill>
+                <a:hlinkClick r:id="rId2"/>
+              </a:rPr>
+              <a:t>http://bulletphysics.org/wordpress/</a:t>
+            </a:r>
+          </a:p>
           <a:p>
             <a:pPr>
               <a:spcBef>
@@ -1444,7 +1487,7 @@
   <p:cSld>
     <p:spTree>
       <p:nvGrpSpPr>
-        <p:cNvPr id="142" name="Shape 142"/>
+        <p:cNvPr id="143" name="Shape 143"/>
         <p:cNvGrpSpPr/>
         <p:nvPr/>
       </p:nvGrpSpPr>
@@ -1458,7 +1501,7 @@
       </p:grpSpPr>
       <p:sp>
         <p:nvSpPr>
-          <p:cNvPr id="143" name="Shape 143"/>
+          <p:cNvPr id="144" name="Shape 144"/>
           <p:cNvSpPr/>
           <p:nvPr>
             <p:ph idx="2" type="sldImg"/>
@@ -1502,7 +1545,7 @@
       </p:sp>
       <p:sp>
         <p:nvSpPr>
-          <p:cNvPr id="144" name="Shape 144"/>
+          <p:cNvPr id="145" name="Shape 145"/>
           <p:cNvSpPr txBox="1"/>
           <p:nvPr>
             <p:ph idx="1" type="body"/>
@@ -1522,6 +1565,23 @@
             <a:noAutofit/>
           </a:bodyPr>
           <a:lstStyle/>
+          <a:p>
+            <a:pPr rtl="0">
+              <a:spcBef>
+                <a:spcPts val="0"/>
+              </a:spcBef>
+              <a:buNone/>
+            </a:pPr>
+            <a:r>
+              <a:rPr lang="en" u="sng">
+                <a:solidFill>
+                  <a:schemeClr val="hlink"/>
+                </a:solidFill>
+                <a:hlinkClick r:id="rId2"/>
+              </a:rPr>
+              <a:t>http://www.havok.com/physics/</a:t>
+            </a:r>
+          </a:p>
           <a:p>
             <a:pPr>
               <a:spcBef>
@@ -1549,7 +1609,7 @@
   <p:cSld>
     <p:spTree>
       <p:nvGrpSpPr>
-        <p:cNvPr id="148" name="Shape 148"/>
+        <p:cNvPr id="149" name="Shape 149"/>
         <p:cNvGrpSpPr/>
         <p:nvPr/>
       </p:nvGrpSpPr>
@@ -1563,7 +1623,7 @@
       </p:grpSpPr>
       <p:sp>
         <p:nvSpPr>
-          <p:cNvPr id="149" name="Shape 149"/>
+          <p:cNvPr id="150" name="Shape 150"/>
           <p:cNvSpPr/>
           <p:nvPr>
             <p:ph idx="2" type="sldImg"/>
@@ -1607,7 +1667,7 @@
       </p:sp>
       <p:sp>
         <p:nvSpPr>
-          <p:cNvPr id="150" name="Shape 150"/>
+          <p:cNvPr id="151" name="Shape 151"/>
           <p:cNvSpPr txBox="1"/>
           <p:nvPr>
             <p:ph idx="1" type="body"/>
@@ -1628,6 +1688,23 @@
           </a:bodyPr>
           <a:lstStyle/>
           <a:p>
+            <a:pPr rtl="0">
+              <a:spcBef>
+                <a:spcPts val="0"/>
+              </a:spcBef>
+              <a:buNone/>
+            </a:pPr>
+            <a:r>
+              <a:rPr lang="en" u="sng">
+                <a:solidFill>
+                  <a:schemeClr val="hlink"/>
+                </a:solidFill>
+                <a:hlinkClick r:id="rId2"/>
+              </a:rPr>
+              <a:t>https://en.wikipedia.org/wiki/Ageia</a:t>
+            </a:r>
+          </a:p>
+          <a:p>
             <a:pPr>
               <a:spcBef>
                 <a:spcPts val="0"/>
@@ -1635,9 +1712,9 @@
               <a:buNone/>
             </a:pPr>
             <a:r>
-              <a:t/>
-            </a:r>
-            <a:endParaRPr/>
+              <a:rPr lang="en"/>
+              <a:t>Does not longer exist, was bought  by NVidia, now PhysX</a:t>
+            </a:r>
           </a:p>
         </p:txBody>
       </p:sp>
@@ -1649,12 +1726,12 @@
 </p:notes>
 </file>
 
-<file path=ppt/notesSlides/notesSlide2.xml><?xml version="1.0" encoding="utf-8"?>
+<file path=ppt/notesSlides/notesSlide19.xml><?xml version="1.0" encoding="utf-8"?>
 <p:notes xmlns:a="http://schemas.openxmlformats.org/drawingml/2006/main" xmlns:r="http://schemas.openxmlformats.org/officeDocument/2006/relationships" xmlns:mc="http://schemas.openxmlformats.org/markup-compatibility/2006" xmlns:mv="urn:schemas-microsoft-com:mac:vml" xmlns:p="http://schemas.openxmlformats.org/presentationml/2006/main" xmlns:c="http://schemas.openxmlformats.org/drawingml/2006/chart" xmlns:dgm="http://schemas.openxmlformats.org/drawingml/2006/diagram" xmlns:o="urn:schemas-microsoft-com:office:office" xmlns:v="urn:schemas-microsoft-com:vml" xmlns:pvml="urn:schemas-microsoft-com:office:powerpoint" xmlns:com="http://schemas.openxmlformats.org/drawingml/2006/compatibility" xmlns:p14="http://schemas.microsoft.com/office/powerpoint/2010/main" showMasterPhAnim="0" showMasterSp="0">
   <p:cSld>
     <p:spTree>
       <p:nvGrpSpPr>
-        <p:cNvPr id="49" name="Shape 49"/>
+        <p:cNvPr id="155" name="Shape 155"/>
         <p:cNvGrpSpPr/>
         <p:nvPr/>
       </p:nvGrpSpPr>
@@ -1668,7 +1745,7 @@
       </p:grpSpPr>
       <p:sp>
         <p:nvSpPr>
-          <p:cNvPr id="50" name="Shape 50"/>
+          <p:cNvPr id="156" name="Shape 156"/>
           <p:cNvSpPr/>
           <p:nvPr>
             <p:ph idx="2" type="sldImg"/>
@@ -1712,7 +1789,7 @@
       </p:sp>
       <p:sp>
         <p:nvSpPr>
-          <p:cNvPr id="51" name="Shape 51"/>
+          <p:cNvPr id="157" name="Shape 157"/>
           <p:cNvSpPr txBox="1"/>
           <p:nvPr>
             <p:ph idx="1" type="body"/>
@@ -1733,6 +1810,128 @@
           </a:bodyPr>
           <a:lstStyle/>
           <a:p>
+            <a:pPr rtl="0">
+              <a:spcBef>
+                <a:spcPts val="0"/>
+              </a:spcBef>
+              <a:buNone/>
+            </a:pPr>
+            <a:r>
+              <a:rPr lang="en" u="sng">
+                <a:solidFill>
+                  <a:schemeClr val="hlink"/>
+                </a:solidFill>
+                <a:hlinkClick r:id="rId2"/>
+              </a:rPr>
+              <a:t>https://developer.nvidia.com/physx-sdk</a:t>
+            </a:r>
+          </a:p>
+          <a:p>
+            <a:pPr lvl="0" rtl="0">
+              <a:spcBef>
+                <a:spcPts val="0"/>
+              </a:spcBef>
+              <a:buNone/>
+            </a:pPr>
+            <a:r>
+              <a:t/>
+            </a:r>
+            <a:endParaRPr/>
+          </a:p>
+        </p:txBody>
+      </p:sp>
+    </p:spTree>
+  </p:cSld>
+  <p:clrMapOvr>
+    <a:masterClrMapping/>
+  </p:clrMapOvr>
+</p:notes>
+</file>
+
+<file path=ppt/notesSlides/notesSlide2.xml><?xml version="1.0" encoding="utf-8"?>
+<p:notes xmlns:a="http://schemas.openxmlformats.org/drawingml/2006/main" xmlns:r="http://schemas.openxmlformats.org/officeDocument/2006/relationships" xmlns:mc="http://schemas.openxmlformats.org/markup-compatibility/2006" xmlns:mv="urn:schemas-microsoft-com:mac:vml" xmlns:p="http://schemas.openxmlformats.org/presentationml/2006/main" xmlns:c="http://schemas.openxmlformats.org/drawingml/2006/chart" xmlns:dgm="http://schemas.openxmlformats.org/drawingml/2006/diagram" xmlns:o="urn:schemas-microsoft-com:office:office" xmlns:v="urn:schemas-microsoft-com:vml" xmlns:pvml="urn:schemas-microsoft-com:office:powerpoint" xmlns:com="http://schemas.openxmlformats.org/drawingml/2006/compatibility" xmlns:p14="http://schemas.microsoft.com/office/powerpoint/2010/main" showMasterPhAnim="0" showMasterSp="0">
+  <p:cSld>
+    <p:spTree>
+      <p:nvGrpSpPr>
+        <p:cNvPr id="49" name="Shape 49"/>
+        <p:cNvGrpSpPr/>
+        <p:nvPr/>
+      </p:nvGrpSpPr>
+      <p:grpSpPr>
+        <a:xfrm>
+          <a:off x="0" y="0"/>
+          <a:ext cx="0" cy="0"/>
+          <a:chOff x="0" y="0"/>
+          <a:chExt cx="0" cy="0"/>
+        </a:xfrm>
+      </p:grpSpPr>
+      <p:sp>
+        <p:nvSpPr>
+          <p:cNvPr id="50" name="Shape 50"/>
+          <p:cNvSpPr/>
+          <p:nvPr>
+            <p:ph idx="2" type="sldImg"/>
+          </p:nvPr>
+        </p:nvSpPr>
+        <p:spPr>
+          <a:xfrm>
+            <a:off x="381187" y="685800"/>
+            <a:ext cx="6096299" cy="3429000"/>
+          </a:xfrm>
+          <a:custGeom>
+            <a:pathLst>
+              <a:path extrusionOk="0" h="120000" w="120000">
+                <a:moveTo>
+                  <a:pt x="0" y="0"/>
+                </a:moveTo>
+                <a:lnTo>
+                  <a:pt x="120000" y="0"/>
+                </a:lnTo>
+                <a:lnTo>
+                  <a:pt x="120000" y="120000"/>
+                </a:lnTo>
+                <a:lnTo>
+                  <a:pt x="0" y="120000"/>
+                </a:lnTo>
+                <a:close/>
+              </a:path>
+            </a:pathLst>
+          </a:custGeom>
+          <a:noFill/>
+          <a:ln cap="flat" cmpd="sng" w="9525">
+            <a:solidFill>
+              <a:srgbClr val="000000"/>
+            </a:solidFill>
+            <a:prstDash val="solid"/>
+            <a:round/>
+            <a:headEnd len="med" w="med" type="none"/>
+            <a:tailEnd len="med" w="med" type="none"/>
+          </a:ln>
+        </p:spPr>
+      </p:sp>
+      <p:sp>
+        <p:nvSpPr>
+          <p:cNvPr id="51" name="Shape 51"/>
+          <p:cNvSpPr txBox="1"/>
+          <p:nvPr>
+            <p:ph idx="1" type="body"/>
+          </p:nvPr>
+        </p:nvSpPr>
+        <p:spPr>
+          <a:xfrm>
+            <a:off x="685800" y="4343400"/>
+            <a:ext cx="5486399" cy="4114800"/>
+          </a:xfrm>
+          <a:prstGeom prst="rect">
+            <a:avLst/>
+          </a:prstGeom>
+        </p:spPr>
+        <p:txBody>
+          <a:bodyPr anchorCtr="0" anchor="t" bIns="91425" lIns="91425" rIns="91425" tIns="91425">
+            <a:noAutofit/>
+          </a:bodyPr>
+          <a:lstStyle/>
+          <a:p>
             <a:pPr>
               <a:spcBef>
                 <a:spcPts val="0"/>
@@ -1743,6 +1942,897 @@
               <a:rPr lang="en"/>
               <a:t>Language does not matter, but doing this in C#, Java, Python, etc. is much easier than trying to do this in native C++, but use whatever you are comfortable with.</a:t>
             </a:r>
+          </a:p>
+        </p:txBody>
+      </p:sp>
+    </p:spTree>
+  </p:cSld>
+  <p:clrMapOvr>
+    <a:masterClrMapping/>
+  </p:clrMapOvr>
+</p:notes>
+</file>
+
+<file path=ppt/notesSlides/notesSlide20.xml><?xml version="1.0" encoding="utf-8"?>
+<p:notes xmlns:a="http://schemas.openxmlformats.org/drawingml/2006/main" xmlns:r="http://schemas.openxmlformats.org/officeDocument/2006/relationships" xmlns:mc="http://schemas.openxmlformats.org/markup-compatibility/2006" xmlns:mv="urn:schemas-microsoft-com:mac:vml" xmlns:p="http://schemas.openxmlformats.org/presentationml/2006/main" xmlns:c="http://schemas.openxmlformats.org/drawingml/2006/chart" xmlns:dgm="http://schemas.openxmlformats.org/drawingml/2006/diagram" xmlns:o="urn:schemas-microsoft-com:office:office" xmlns:v="urn:schemas-microsoft-com:vml" xmlns:pvml="urn:schemas-microsoft-com:office:powerpoint" xmlns:com="http://schemas.openxmlformats.org/drawingml/2006/compatibility" xmlns:p14="http://schemas.microsoft.com/office/powerpoint/2010/main" showMasterPhAnim="0" showMasterSp="0">
+  <p:cSld>
+    <p:spTree>
+      <p:nvGrpSpPr>
+        <p:cNvPr id="161" name="Shape 161"/>
+        <p:cNvGrpSpPr/>
+        <p:nvPr/>
+      </p:nvGrpSpPr>
+      <p:grpSpPr>
+        <a:xfrm>
+          <a:off x="0" y="0"/>
+          <a:ext cx="0" cy="0"/>
+          <a:chOff x="0" y="0"/>
+          <a:chExt cx="0" cy="0"/>
+        </a:xfrm>
+      </p:grpSpPr>
+      <p:sp>
+        <p:nvSpPr>
+          <p:cNvPr id="162" name="Shape 162"/>
+          <p:cNvSpPr/>
+          <p:nvPr>
+            <p:ph idx="2" type="sldImg"/>
+          </p:nvPr>
+        </p:nvSpPr>
+        <p:spPr>
+          <a:xfrm>
+            <a:off x="381187" y="685800"/>
+            <a:ext cx="6096299" cy="3429000"/>
+          </a:xfrm>
+          <a:custGeom>
+            <a:pathLst>
+              <a:path extrusionOk="0" h="120000" w="120000">
+                <a:moveTo>
+                  <a:pt x="0" y="0"/>
+                </a:moveTo>
+                <a:lnTo>
+                  <a:pt x="120000" y="0"/>
+                </a:lnTo>
+                <a:lnTo>
+                  <a:pt x="120000" y="120000"/>
+                </a:lnTo>
+                <a:lnTo>
+                  <a:pt x="0" y="120000"/>
+                </a:lnTo>
+                <a:close/>
+              </a:path>
+            </a:pathLst>
+          </a:custGeom>
+          <a:noFill/>
+          <a:ln cap="flat" cmpd="sng" w="9525">
+            <a:solidFill>
+              <a:srgbClr val="000000"/>
+            </a:solidFill>
+            <a:prstDash val="solid"/>
+            <a:round/>
+            <a:headEnd len="med" w="med" type="none"/>
+            <a:tailEnd len="med" w="med" type="none"/>
+          </a:ln>
+        </p:spPr>
+      </p:sp>
+      <p:sp>
+        <p:nvSpPr>
+          <p:cNvPr id="163" name="Shape 163"/>
+          <p:cNvSpPr txBox="1"/>
+          <p:nvPr>
+            <p:ph idx="1" type="body"/>
+          </p:nvPr>
+        </p:nvSpPr>
+        <p:spPr>
+          <a:xfrm>
+            <a:off x="685800" y="4343400"/>
+            <a:ext cx="5486399" cy="4114800"/>
+          </a:xfrm>
+          <a:prstGeom prst="rect">
+            <a:avLst/>
+          </a:prstGeom>
+        </p:spPr>
+        <p:txBody>
+          <a:bodyPr anchorCtr="0" anchor="t" bIns="91425" lIns="91425" rIns="91425" tIns="91425">
+            <a:noAutofit/>
+          </a:bodyPr>
+          <a:lstStyle/>
+          <a:p>
+            <a:pPr>
+              <a:spcBef>
+                <a:spcPts val="0"/>
+              </a:spcBef>
+              <a:buNone/>
+            </a:pPr>
+            <a:r>
+              <a:t/>
+            </a:r>
+            <a:endParaRPr/>
+          </a:p>
+        </p:txBody>
+      </p:sp>
+    </p:spTree>
+  </p:cSld>
+  <p:clrMapOvr>
+    <a:masterClrMapping/>
+  </p:clrMapOvr>
+</p:notes>
+</file>
+
+<file path=ppt/notesSlides/notesSlide21.xml><?xml version="1.0" encoding="utf-8"?>
+<p:notes xmlns:a="http://schemas.openxmlformats.org/drawingml/2006/main" xmlns:r="http://schemas.openxmlformats.org/officeDocument/2006/relationships" xmlns:mc="http://schemas.openxmlformats.org/markup-compatibility/2006" xmlns:mv="urn:schemas-microsoft-com:mac:vml" xmlns:p="http://schemas.openxmlformats.org/presentationml/2006/main" xmlns:c="http://schemas.openxmlformats.org/drawingml/2006/chart" xmlns:dgm="http://schemas.openxmlformats.org/drawingml/2006/diagram" xmlns:o="urn:schemas-microsoft-com:office:office" xmlns:v="urn:schemas-microsoft-com:vml" xmlns:pvml="urn:schemas-microsoft-com:office:powerpoint" xmlns:com="http://schemas.openxmlformats.org/drawingml/2006/compatibility" xmlns:p14="http://schemas.microsoft.com/office/powerpoint/2010/main" showMasterPhAnim="0" showMasterSp="0">
+  <p:cSld>
+    <p:spTree>
+      <p:nvGrpSpPr>
+        <p:cNvPr id="167" name="Shape 167"/>
+        <p:cNvGrpSpPr/>
+        <p:nvPr/>
+      </p:nvGrpSpPr>
+      <p:grpSpPr>
+        <a:xfrm>
+          <a:off x="0" y="0"/>
+          <a:ext cx="0" cy="0"/>
+          <a:chOff x="0" y="0"/>
+          <a:chExt cx="0" cy="0"/>
+        </a:xfrm>
+      </p:grpSpPr>
+      <p:sp>
+        <p:nvSpPr>
+          <p:cNvPr id="168" name="Shape 168"/>
+          <p:cNvSpPr/>
+          <p:nvPr>
+            <p:ph idx="2" type="sldImg"/>
+          </p:nvPr>
+        </p:nvSpPr>
+        <p:spPr>
+          <a:xfrm>
+            <a:off x="381187" y="685800"/>
+            <a:ext cx="6096299" cy="3429000"/>
+          </a:xfrm>
+          <a:custGeom>
+            <a:pathLst>
+              <a:path extrusionOk="0" h="120000" w="120000">
+                <a:moveTo>
+                  <a:pt x="0" y="0"/>
+                </a:moveTo>
+                <a:lnTo>
+                  <a:pt x="120000" y="0"/>
+                </a:lnTo>
+                <a:lnTo>
+                  <a:pt x="120000" y="120000"/>
+                </a:lnTo>
+                <a:lnTo>
+                  <a:pt x="0" y="120000"/>
+                </a:lnTo>
+                <a:close/>
+              </a:path>
+            </a:pathLst>
+          </a:custGeom>
+          <a:noFill/>
+          <a:ln cap="flat" cmpd="sng" w="9525">
+            <a:solidFill>
+              <a:srgbClr val="000000"/>
+            </a:solidFill>
+            <a:prstDash val="solid"/>
+            <a:round/>
+            <a:headEnd len="med" w="med" type="none"/>
+            <a:tailEnd len="med" w="med" type="none"/>
+          </a:ln>
+        </p:spPr>
+      </p:sp>
+      <p:sp>
+        <p:nvSpPr>
+          <p:cNvPr id="169" name="Shape 169"/>
+          <p:cNvSpPr txBox="1"/>
+          <p:nvPr>
+            <p:ph idx="1" type="body"/>
+          </p:nvPr>
+        </p:nvSpPr>
+        <p:spPr>
+          <a:xfrm>
+            <a:off x="685800" y="4343400"/>
+            <a:ext cx="5486399" cy="4114800"/>
+          </a:xfrm>
+          <a:prstGeom prst="rect">
+            <a:avLst/>
+          </a:prstGeom>
+        </p:spPr>
+        <p:txBody>
+          <a:bodyPr anchorCtr="0" anchor="t" bIns="91425" lIns="91425" rIns="91425" tIns="91425">
+            <a:noAutofit/>
+          </a:bodyPr>
+          <a:lstStyle/>
+          <a:p>
+            <a:pPr rtl="0">
+              <a:spcBef>
+                <a:spcPts val="0"/>
+              </a:spcBef>
+              <a:buNone/>
+            </a:pPr>
+            <a:r>
+              <a:rPr lang="en" u="sng">
+                <a:solidFill>
+                  <a:schemeClr val="hlink"/>
+                </a:solidFill>
+                <a:hlinkClick r:id="rId2"/>
+              </a:rPr>
+              <a:t>https://code.google.com/p/jitterphysics/</a:t>
+            </a:r>
+          </a:p>
+          <a:p>
+            <a:pPr rtl="0">
+              <a:spcBef>
+                <a:spcPts val="0"/>
+              </a:spcBef>
+              <a:buNone/>
+            </a:pPr>
+            <a:r>
+              <a:rPr lang="en" u="sng">
+                <a:solidFill>
+                  <a:schemeClr val="hlink"/>
+                </a:solidFill>
+                <a:hlinkClick r:id="rId3"/>
+              </a:rPr>
+              <a:t>http://www.rowlhouse.co.uk/jiglib/</a:t>
+            </a:r>
+          </a:p>
+          <a:p>
+            <a:pPr>
+              <a:spcBef>
+                <a:spcPts val="0"/>
+              </a:spcBef>
+              <a:buNone/>
+            </a:pPr>
+            <a:r>
+              <a:t/>
+            </a:r>
+            <a:endParaRPr/>
+          </a:p>
+        </p:txBody>
+      </p:sp>
+    </p:spTree>
+  </p:cSld>
+  <p:clrMapOvr>
+    <a:masterClrMapping/>
+  </p:clrMapOvr>
+</p:notes>
+</file>
+
+<file path=ppt/notesSlides/notesSlide22.xml><?xml version="1.0" encoding="utf-8"?>
+<p:notes xmlns:a="http://schemas.openxmlformats.org/drawingml/2006/main" xmlns:r="http://schemas.openxmlformats.org/officeDocument/2006/relationships" xmlns:mc="http://schemas.openxmlformats.org/markup-compatibility/2006" xmlns:mv="urn:schemas-microsoft-com:mac:vml" xmlns:p="http://schemas.openxmlformats.org/presentationml/2006/main" xmlns:c="http://schemas.openxmlformats.org/drawingml/2006/chart" xmlns:dgm="http://schemas.openxmlformats.org/drawingml/2006/diagram" xmlns:o="urn:schemas-microsoft-com:office:office" xmlns:v="urn:schemas-microsoft-com:vml" xmlns:pvml="urn:schemas-microsoft-com:office:powerpoint" xmlns:com="http://schemas.openxmlformats.org/drawingml/2006/compatibility" xmlns:p14="http://schemas.microsoft.com/office/powerpoint/2010/main" showMasterPhAnim="0" showMasterSp="0">
+  <p:cSld>
+    <p:spTree>
+      <p:nvGrpSpPr>
+        <p:cNvPr id="174" name="Shape 174"/>
+        <p:cNvGrpSpPr/>
+        <p:nvPr/>
+      </p:nvGrpSpPr>
+      <p:grpSpPr>
+        <a:xfrm>
+          <a:off x="0" y="0"/>
+          <a:ext cx="0" cy="0"/>
+          <a:chOff x="0" y="0"/>
+          <a:chExt cx="0" cy="0"/>
+        </a:xfrm>
+      </p:grpSpPr>
+      <p:sp>
+        <p:nvSpPr>
+          <p:cNvPr id="175" name="Shape 175"/>
+          <p:cNvSpPr/>
+          <p:nvPr>
+            <p:ph idx="2" type="sldImg"/>
+          </p:nvPr>
+        </p:nvSpPr>
+        <p:spPr>
+          <a:xfrm>
+            <a:off x="381187" y="685800"/>
+            <a:ext cx="6096299" cy="3429000"/>
+          </a:xfrm>
+          <a:custGeom>
+            <a:pathLst>
+              <a:path extrusionOk="0" h="120000" w="120000">
+                <a:moveTo>
+                  <a:pt x="0" y="0"/>
+                </a:moveTo>
+                <a:lnTo>
+                  <a:pt x="120000" y="0"/>
+                </a:lnTo>
+                <a:lnTo>
+                  <a:pt x="120000" y="120000"/>
+                </a:lnTo>
+                <a:lnTo>
+                  <a:pt x="0" y="120000"/>
+                </a:lnTo>
+                <a:close/>
+              </a:path>
+            </a:pathLst>
+          </a:custGeom>
+          <a:noFill/>
+          <a:ln cap="flat" cmpd="sng" w="9525">
+            <a:solidFill>
+              <a:srgbClr val="000000"/>
+            </a:solidFill>
+            <a:prstDash val="solid"/>
+            <a:round/>
+            <a:headEnd len="med" w="med" type="none"/>
+            <a:tailEnd len="med" w="med" type="none"/>
+          </a:ln>
+        </p:spPr>
+      </p:sp>
+      <p:sp>
+        <p:nvSpPr>
+          <p:cNvPr id="176" name="Shape 176"/>
+          <p:cNvSpPr txBox="1"/>
+          <p:nvPr>
+            <p:ph idx="1" type="body"/>
+          </p:nvPr>
+        </p:nvSpPr>
+        <p:spPr>
+          <a:xfrm>
+            <a:off x="685800" y="4343400"/>
+            <a:ext cx="5486399" cy="4114800"/>
+          </a:xfrm>
+          <a:prstGeom prst="rect">
+            <a:avLst/>
+          </a:prstGeom>
+        </p:spPr>
+        <p:txBody>
+          <a:bodyPr anchorCtr="0" anchor="t" bIns="91425" lIns="91425" rIns="91425" tIns="91425">
+            <a:noAutofit/>
+          </a:bodyPr>
+          <a:lstStyle/>
+          <a:p>
+            <a:pPr>
+              <a:spcBef>
+                <a:spcPts val="0"/>
+              </a:spcBef>
+              <a:buNone/>
+            </a:pPr>
+            <a:r>
+              <a:t/>
+            </a:r>
+            <a:endParaRPr/>
+          </a:p>
+        </p:txBody>
+      </p:sp>
+    </p:spTree>
+  </p:cSld>
+  <p:clrMapOvr>
+    <a:masterClrMapping/>
+  </p:clrMapOvr>
+</p:notes>
+</file>
+
+<file path=ppt/notesSlides/notesSlide23.xml><?xml version="1.0" encoding="utf-8"?>
+<p:notes xmlns:a="http://schemas.openxmlformats.org/drawingml/2006/main" xmlns:r="http://schemas.openxmlformats.org/officeDocument/2006/relationships" xmlns:mc="http://schemas.openxmlformats.org/markup-compatibility/2006" xmlns:mv="urn:schemas-microsoft-com:mac:vml" xmlns:p="http://schemas.openxmlformats.org/presentationml/2006/main" xmlns:c="http://schemas.openxmlformats.org/drawingml/2006/chart" xmlns:dgm="http://schemas.openxmlformats.org/drawingml/2006/diagram" xmlns:o="urn:schemas-microsoft-com:office:office" xmlns:v="urn:schemas-microsoft-com:vml" xmlns:pvml="urn:schemas-microsoft-com:office:powerpoint" xmlns:com="http://schemas.openxmlformats.org/drawingml/2006/compatibility" xmlns:p14="http://schemas.microsoft.com/office/powerpoint/2010/main" showMasterPhAnim="0" showMasterSp="0">
+  <p:cSld>
+    <p:spTree>
+      <p:nvGrpSpPr>
+        <p:cNvPr id="180" name="Shape 180"/>
+        <p:cNvGrpSpPr/>
+        <p:nvPr/>
+      </p:nvGrpSpPr>
+      <p:grpSpPr>
+        <a:xfrm>
+          <a:off x="0" y="0"/>
+          <a:ext cx="0" cy="0"/>
+          <a:chOff x="0" y="0"/>
+          <a:chExt cx="0" cy="0"/>
+        </a:xfrm>
+      </p:grpSpPr>
+      <p:sp>
+        <p:nvSpPr>
+          <p:cNvPr id="181" name="Shape 181"/>
+          <p:cNvSpPr/>
+          <p:nvPr>
+            <p:ph idx="2" type="sldImg"/>
+          </p:nvPr>
+        </p:nvSpPr>
+        <p:spPr>
+          <a:xfrm>
+            <a:off x="381187" y="685800"/>
+            <a:ext cx="6096299" cy="3429000"/>
+          </a:xfrm>
+          <a:custGeom>
+            <a:pathLst>
+              <a:path extrusionOk="0" h="120000" w="120000">
+                <a:moveTo>
+                  <a:pt x="0" y="0"/>
+                </a:moveTo>
+                <a:lnTo>
+                  <a:pt x="120000" y="0"/>
+                </a:lnTo>
+                <a:lnTo>
+                  <a:pt x="120000" y="120000"/>
+                </a:lnTo>
+                <a:lnTo>
+                  <a:pt x="0" y="120000"/>
+                </a:lnTo>
+                <a:close/>
+              </a:path>
+            </a:pathLst>
+          </a:custGeom>
+          <a:noFill/>
+          <a:ln cap="flat" cmpd="sng" w="9525">
+            <a:solidFill>
+              <a:srgbClr val="000000"/>
+            </a:solidFill>
+            <a:prstDash val="solid"/>
+            <a:round/>
+            <a:headEnd len="med" w="med" type="none"/>
+            <a:tailEnd len="med" w="med" type="none"/>
+          </a:ln>
+        </p:spPr>
+      </p:sp>
+      <p:sp>
+        <p:nvSpPr>
+          <p:cNvPr id="182" name="Shape 182"/>
+          <p:cNvSpPr txBox="1"/>
+          <p:nvPr>
+            <p:ph idx="1" type="body"/>
+          </p:nvPr>
+        </p:nvSpPr>
+        <p:spPr>
+          <a:xfrm>
+            <a:off x="685800" y="4343400"/>
+            <a:ext cx="5486399" cy="4114800"/>
+          </a:xfrm>
+          <a:prstGeom prst="rect">
+            <a:avLst/>
+          </a:prstGeom>
+        </p:spPr>
+        <p:txBody>
+          <a:bodyPr anchorCtr="0" anchor="t" bIns="91425" lIns="91425" rIns="91425" tIns="91425">
+            <a:noAutofit/>
+          </a:bodyPr>
+          <a:lstStyle/>
+          <a:p>
+            <a:pPr rtl="0">
+              <a:spcBef>
+                <a:spcPts val="0"/>
+              </a:spcBef>
+              <a:buNone/>
+            </a:pPr>
+            <a:r>
+              <a:rPr lang="en" u="sng">
+                <a:solidFill>
+                  <a:schemeClr val="hlink"/>
+                </a:solidFill>
+                <a:hlinkClick r:id="rId2"/>
+              </a:rPr>
+              <a:t>https://developer.nvidia.com/physx-sdk</a:t>
+            </a:r>
+          </a:p>
+          <a:p>
+            <a:pPr>
+              <a:spcBef>
+                <a:spcPts val="0"/>
+              </a:spcBef>
+              <a:buNone/>
+            </a:pPr>
+            <a:r>
+              <a:t/>
+            </a:r>
+            <a:endParaRPr/>
+          </a:p>
+        </p:txBody>
+      </p:sp>
+    </p:spTree>
+  </p:cSld>
+  <p:clrMapOvr>
+    <a:masterClrMapping/>
+  </p:clrMapOvr>
+</p:notes>
+</file>
+
+<file path=ppt/notesSlides/notesSlide24.xml><?xml version="1.0" encoding="utf-8"?>
+<p:notes xmlns:a="http://schemas.openxmlformats.org/drawingml/2006/main" xmlns:r="http://schemas.openxmlformats.org/officeDocument/2006/relationships" xmlns:mc="http://schemas.openxmlformats.org/markup-compatibility/2006" xmlns:mv="urn:schemas-microsoft-com:mac:vml" xmlns:p="http://schemas.openxmlformats.org/presentationml/2006/main" xmlns:c="http://schemas.openxmlformats.org/drawingml/2006/chart" xmlns:dgm="http://schemas.openxmlformats.org/drawingml/2006/diagram" xmlns:o="urn:schemas-microsoft-com:office:office" xmlns:v="urn:schemas-microsoft-com:vml" xmlns:pvml="urn:schemas-microsoft-com:office:powerpoint" xmlns:com="http://schemas.openxmlformats.org/drawingml/2006/compatibility" xmlns:p14="http://schemas.microsoft.com/office/powerpoint/2010/main" showMasterPhAnim="0" showMasterSp="0">
+  <p:cSld>
+    <p:spTree>
+      <p:nvGrpSpPr>
+        <p:cNvPr id="186" name="Shape 186"/>
+        <p:cNvGrpSpPr/>
+        <p:nvPr/>
+      </p:nvGrpSpPr>
+      <p:grpSpPr>
+        <a:xfrm>
+          <a:off x="0" y="0"/>
+          <a:ext cx="0" cy="0"/>
+          <a:chOff x="0" y="0"/>
+          <a:chExt cx="0" cy="0"/>
+        </a:xfrm>
+      </p:grpSpPr>
+      <p:sp>
+        <p:nvSpPr>
+          <p:cNvPr id="187" name="Shape 187"/>
+          <p:cNvSpPr/>
+          <p:nvPr>
+            <p:ph idx="2" type="sldImg"/>
+          </p:nvPr>
+        </p:nvSpPr>
+        <p:spPr>
+          <a:xfrm>
+            <a:off x="381187" y="685800"/>
+            <a:ext cx="6096299" cy="3429000"/>
+          </a:xfrm>
+          <a:custGeom>
+            <a:pathLst>
+              <a:path extrusionOk="0" h="120000" w="120000">
+                <a:moveTo>
+                  <a:pt x="0" y="0"/>
+                </a:moveTo>
+                <a:lnTo>
+                  <a:pt x="120000" y="0"/>
+                </a:lnTo>
+                <a:lnTo>
+                  <a:pt x="120000" y="120000"/>
+                </a:lnTo>
+                <a:lnTo>
+                  <a:pt x="0" y="120000"/>
+                </a:lnTo>
+                <a:close/>
+              </a:path>
+            </a:pathLst>
+          </a:custGeom>
+          <a:noFill/>
+          <a:ln cap="flat" cmpd="sng" w="9525">
+            <a:solidFill>
+              <a:srgbClr val="000000"/>
+            </a:solidFill>
+            <a:prstDash val="solid"/>
+            <a:round/>
+            <a:headEnd len="med" w="med" type="none"/>
+            <a:tailEnd len="med" w="med" type="none"/>
+          </a:ln>
+        </p:spPr>
+      </p:sp>
+      <p:sp>
+        <p:nvSpPr>
+          <p:cNvPr id="188" name="Shape 188"/>
+          <p:cNvSpPr txBox="1"/>
+          <p:nvPr>
+            <p:ph idx="1" type="body"/>
+          </p:nvPr>
+        </p:nvSpPr>
+        <p:spPr>
+          <a:xfrm>
+            <a:off x="685800" y="4343400"/>
+            <a:ext cx="5486399" cy="4114800"/>
+          </a:xfrm>
+          <a:prstGeom prst="rect">
+            <a:avLst/>
+          </a:prstGeom>
+        </p:spPr>
+        <p:txBody>
+          <a:bodyPr anchorCtr="0" anchor="t" bIns="91425" lIns="91425" rIns="91425" tIns="91425">
+            <a:noAutofit/>
+          </a:bodyPr>
+          <a:lstStyle/>
+          <a:p>
+            <a:pPr>
+              <a:spcBef>
+                <a:spcPts val="0"/>
+              </a:spcBef>
+              <a:buNone/>
+            </a:pPr>
+            <a:r>
+              <a:t/>
+            </a:r>
+            <a:endParaRPr/>
+          </a:p>
+        </p:txBody>
+      </p:sp>
+    </p:spTree>
+  </p:cSld>
+  <p:clrMapOvr>
+    <a:masterClrMapping/>
+  </p:clrMapOvr>
+</p:notes>
+</file>
+
+<file path=ppt/notesSlides/notesSlide25.xml><?xml version="1.0" encoding="utf-8"?>
+<p:notes xmlns:a="http://schemas.openxmlformats.org/drawingml/2006/main" xmlns:r="http://schemas.openxmlformats.org/officeDocument/2006/relationships" xmlns:mc="http://schemas.openxmlformats.org/markup-compatibility/2006" xmlns:mv="urn:schemas-microsoft-com:mac:vml" xmlns:p="http://schemas.openxmlformats.org/presentationml/2006/main" xmlns:c="http://schemas.openxmlformats.org/drawingml/2006/chart" xmlns:dgm="http://schemas.openxmlformats.org/drawingml/2006/diagram" xmlns:o="urn:schemas-microsoft-com:office:office" xmlns:v="urn:schemas-microsoft-com:vml" xmlns:pvml="urn:schemas-microsoft-com:office:powerpoint" xmlns:com="http://schemas.openxmlformats.org/drawingml/2006/compatibility" xmlns:p14="http://schemas.microsoft.com/office/powerpoint/2010/main" showMasterPhAnim="0" showMasterSp="0">
+  <p:cSld>
+    <p:spTree>
+      <p:nvGrpSpPr>
+        <p:cNvPr id="192" name="Shape 192"/>
+        <p:cNvGrpSpPr/>
+        <p:nvPr/>
+      </p:nvGrpSpPr>
+      <p:grpSpPr>
+        <a:xfrm>
+          <a:off x="0" y="0"/>
+          <a:ext cx="0" cy="0"/>
+          <a:chOff x="0" y="0"/>
+          <a:chExt cx="0" cy="0"/>
+        </a:xfrm>
+      </p:grpSpPr>
+      <p:sp>
+        <p:nvSpPr>
+          <p:cNvPr id="193" name="Shape 193"/>
+          <p:cNvSpPr/>
+          <p:nvPr>
+            <p:ph idx="2" type="sldImg"/>
+          </p:nvPr>
+        </p:nvSpPr>
+        <p:spPr>
+          <a:xfrm>
+            <a:off x="381187" y="685800"/>
+            <a:ext cx="6096299" cy="3429000"/>
+          </a:xfrm>
+          <a:custGeom>
+            <a:pathLst>
+              <a:path extrusionOk="0" h="120000" w="120000">
+                <a:moveTo>
+                  <a:pt x="0" y="0"/>
+                </a:moveTo>
+                <a:lnTo>
+                  <a:pt x="120000" y="0"/>
+                </a:lnTo>
+                <a:lnTo>
+                  <a:pt x="120000" y="120000"/>
+                </a:lnTo>
+                <a:lnTo>
+                  <a:pt x="0" y="120000"/>
+                </a:lnTo>
+                <a:close/>
+              </a:path>
+            </a:pathLst>
+          </a:custGeom>
+          <a:noFill/>
+          <a:ln cap="flat" cmpd="sng" w="9525">
+            <a:solidFill>
+              <a:srgbClr val="000000"/>
+            </a:solidFill>
+            <a:prstDash val="solid"/>
+            <a:round/>
+            <a:headEnd len="med" w="med" type="none"/>
+            <a:tailEnd len="med" w="med" type="none"/>
+          </a:ln>
+        </p:spPr>
+      </p:sp>
+      <p:sp>
+        <p:nvSpPr>
+          <p:cNvPr id="194" name="Shape 194"/>
+          <p:cNvSpPr txBox="1"/>
+          <p:nvPr>
+            <p:ph idx="1" type="body"/>
+          </p:nvPr>
+        </p:nvSpPr>
+        <p:spPr>
+          <a:xfrm>
+            <a:off x="685800" y="4343400"/>
+            <a:ext cx="5486399" cy="4114800"/>
+          </a:xfrm>
+          <a:prstGeom prst="rect">
+            <a:avLst/>
+          </a:prstGeom>
+        </p:spPr>
+        <p:txBody>
+          <a:bodyPr anchorCtr="0" anchor="t" bIns="91425" lIns="91425" rIns="91425" tIns="91425">
+            <a:noAutofit/>
+          </a:bodyPr>
+          <a:lstStyle/>
+          <a:p>
+            <a:pPr>
+              <a:spcBef>
+                <a:spcPts val="0"/>
+              </a:spcBef>
+              <a:buNone/>
+            </a:pPr>
+            <a:r>
+              <a:t/>
+            </a:r>
+            <a:endParaRPr/>
+          </a:p>
+        </p:txBody>
+      </p:sp>
+    </p:spTree>
+  </p:cSld>
+  <p:clrMapOvr>
+    <a:masterClrMapping/>
+  </p:clrMapOvr>
+</p:notes>
+</file>
+
+<file path=ppt/notesSlides/notesSlide26.xml><?xml version="1.0" encoding="utf-8"?>
+<p:notes xmlns:a="http://schemas.openxmlformats.org/drawingml/2006/main" xmlns:r="http://schemas.openxmlformats.org/officeDocument/2006/relationships" xmlns:mc="http://schemas.openxmlformats.org/markup-compatibility/2006" xmlns:mv="urn:schemas-microsoft-com:mac:vml" xmlns:p="http://schemas.openxmlformats.org/presentationml/2006/main" xmlns:c="http://schemas.openxmlformats.org/drawingml/2006/chart" xmlns:dgm="http://schemas.openxmlformats.org/drawingml/2006/diagram" xmlns:o="urn:schemas-microsoft-com:office:office" xmlns:v="urn:schemas-microsoft-com:vml" xmlns:pvml="urn:schemas-microsoft-com:office:powerpoint" xmlns:com="http://schemas.openxmlformats.org/drawingml/2006/compatibility" xmlns:p14="http://schemas.microsoft.com/office/powerpoint/2010/main" showMasterPhAnim="0" showMasterSp="0">
+  <p:cSld>
+    <p:spTree>
+      <p:nvGrpSpPr>
+        <p:cNvPr id="198" name="Shape 198"/>
+        <p:cNvGrpSpPr/>
+        <p:nvPr/>
+      </p:nvGrpSpPr>
+      <p:grpSpPr>
+        <a:xfrm>
+          <a:off x="0" y="0"/>
+          <a:ext cx="0" cy="0"/>
+          <a:chOff x="0" y="0"/>
+          <a:chExt cx="0" cy="0"/>
+        </a:xfrm>
+      </p:grpSpPr>
+      <p:sp>
+        <p:nvSpPr>
+          <p:cNvPr id="199" name="Shape 199"/>
+          <p:cNvSpPr/>
+          <p:nvPr>
+            <p:ph idx="2" type="sldImg"/>
+          </p:nvPr>
+        </p:nvSpPr>
+        <p:spPr>
+          <a:xfrm>
+            <a:off x="381187" y="685800"/>
+            <a:ext cx="6096299" cy="3429000"/>
+          </a:xfrm>
+          <a:custGeom>
+            <a:pathLst>
+              <a:path extrusionOk="0" h="120000" w="120000">
+                <a:moveTo>
+                  <a:pt x="0" y="0"/>
+                </a:moveTo>
+                <a:lnTo>
+                  <a:pt x="120000" y="0"/>
+                </a:lnTo>
+                <a:lnTo>
+                  <a:pt x="120000" y="120000"/>
+                </a:lnTo>
+                <a:lnTo>
+                  <a:pt x="0" y="120000"/>
+                </a:lnTo>
+                <a:close/>
+              </a:path>
+            </a:pathLst>
+          </a:custGeom>
+          <a:noFill/>
+          <a:ln cap="flat" cmpd="sng" w="9525">
+            <a:solidFill>
+              <a:srgbClr val="000000"/>
+            </a:solidFill>
+            <a:prstDash val="solid"/>
+            <a:round/>
+            <a:headEnd len="med" w="med" type="none"/>
+            <a:tailEnd len="med" w="med" type="none"/>
+          </a:ln>
+        </p:spPr>
+      </p:sp>
+      <p:sp>
+        <p:nvSpPr>
+          <p:cNvPr id="200" name="Shape 200"/>
+          <p:cNvSpPr txBox="1"/>
+          <p:nvPr>
+            <p:ph idx="1" type="body"/>
+          </p:nvPr>
+        </p:nvSpPr>
+        <p:spPr>
+          <a:xfrm>
+            <a:off x="685800" y="4343400"/>
+            <a:ext cx="5486399" cy="4114800"/>
+          </a:xfrm>
+          <a:prstGeom prst="rect">
+            <a:avLst/>
+          </a:prstGeom>
+        </p:spPr>
+        <p:txBody>
+          <a:bodyPr anchorCtr="0" anchor="t" bIns="91425" lIns="91425" rIns="91425" tIns="91425">
+            <a:noAutofit/>
+          </a:bodyPr>
+          <a:lstStyle/>
+          <a:p>
+            <a:pPr>
+              <a:spcBef>
+                <a:spcPts val="0"/>
+              </a:spcBef>
+              <a:buNone/>
+            </a:pPr>
+            <a:r>
+              <a:t/>
+            </a:r>
+            <a:endParaRPr/>
+          </a:p>
+        </p:txBody>
+      </p:sp>
+    </p:spTree>
+  </p:cSld>
+  <p:clrMapOvr>
+    <a:masterClrMapping/>
+  </p:clrMapOvr>
+</p:notes>
+</file>
+
+<file path=ppt/notesSlides/notesSlide27.xml><?xml version="1.0" encoding="utf-8"?>
+<p:notes xmlns:a="http://schemas.openxmlformats.org/drawingml/2006/main" xmlns:r="http://schemas.openxmlformats.org/officeDocument/2006/relationships" xmlns:mc="http://schemas.openxmlformats.org/markup-compatibility/2006" xmlns:mv="urn:schemas-microsoft-com:mac:vml" xmlns:p="http://schemas.openxmlformats.org/presentationml/2006/main" xmlns:c="http://schemas.openxmlformats.org/drawingml/2006/chart" xmlns:dgm="http://schemas.openxmlformats.org/drawingml/2006/diagram" xmlns:o="urn:schemas-microsoft-com:office:office" xmlns:v="urn:schemas-microsoft-com:vml" xmlns:pvml="urn:schemas-microsoft-com:office:powerpoint" xmlns:com="http://schemas.openxmlformats.org/drawingml/2006/compatibility" xmlns:p14="http://schemas.microsoft.com/office/powerpoint/2010/main" showMasterPhAnim="0" showMasterSp="0">
+  <p:cSld>
+    <p:spTree>
+      <p:nvGrpSpPr>
+        <p:cNvPr id="204" name="Shape 204"/>
+        <p:cNvGrpSpPr/>
+        <p:nvPr/>
+      </p:nvGrpSpPr>
+      <p:grpSpPr>
+        <a:xfrm>
+          <a:off x="0" y="0"/>
+          <a:ext cx="0" cy="0"/>
+          <a:chOff x="0" y="0"/>
+          <a:chExt cx="0" cy="0"/>
+        </a:xfrm>
+      </p:grpSpPr>
+      <p:sp>
+        <p:nvSpPr>
+          <p:cNvPr id="205" name="Shape 205"/>
+          <p:cNvSpPr/>
+          <p:nvPr>
+            <p:ph idx="2" type="sldImg"/>
+          </p:nvPr>
+        </p:nvSpPr>
+        <p:spPr>
+          <a:xfrm>
+            <a:off x="381187" y="685800"/>
+            <a:ext cx="6096299" cy="3429000"/>
+          </a:xfrm>
+          <a:custGeom>
+            <a:pathLst>
+              <a:path extrusionOk="0" h="120000" w="120000">
+                <a:moveTo>
+                  <a:pt x="0" y="0"/>
+                </a:moveTo>
+                <a:lnTo>
+                  <a:pt x="120000" y="0"/>
+                </a:lnTo>
+                <a:lnTo>
+                  <a:pt x="120000" y="120000"/>
+                </a:lnTo>
+                <a:lnTo>
+                  <a:pt x="0" y="120000"/>
+                </a:lnTo>
+                <a:close/>
+              </a:path>
+            </a:pathLst>
+          </a:custGeom>
+          <a:noFill/>
+          <a:ln cap="flat" cmpd="sng" w="9525">
+            <a:solidFill>
+              <a:srgbClr val="000000"/>
+            </a:solidFill>
+            <a:prstDash val="solid"/>
+            <a:round/>
+            <a:headEnd len="med" w="med" type="none"/>
+            <a:tailEnd len="med" w="med" type="none"/>
+          </a:ln>
+        </p:spPr>
+      </p:sp>
+      <p:sp>
+        <p:nvSpPr>
+          <p:cNvPr id="206" name="Shape 206"/>
+          <p:cNvSpPr txBox="1"/>
+          <p:nvPr>
+            <p:ph idx="1" type="body"/>
+          </p:nvPr>
+        </p:nvSpPr>
+        <p:spPr>
+          <a:xfrm>
+            <a:off x="685800" y="4343400"/>
+            <a:ext cx="5486399" cy="4114800"/>
+          </a:xfrm>
+          <a:prstGeom prst="rect">
+            <a:avLst/>
+          </a:prstGeom>
+        </p:spPr>
+        <p:txBody>
+          <a:bodyPr anchorCtr="0" anchor="t" bIns="91425" lIns="91425" rIns="91425" tIns="91425">
+            <a:noAutofit/>
+          </a:bodyPr>
+          <a:lstStyle/>
+          <a:p>
+            <a:pPr>
+              <a:spcBef>
+                <a:spcPts val="0"/>
+              </a:spcBef>
+              <a:buNone/>
+            </a:pPr>
+            <a:r>
+              <a:t/>
+            </a:r>
+            <a:endParaRPr/>
           </a:p>
         </p:txBody>
       </p:sp>
@@ -5648,7 +6738,7 @@
         <p:spPr>
           <a:xfrm>
             <a:off x="457200" y="1200150"/>
-            <a:ext cx="8229600" cy="3725699"/>
+            <a:ext cx="8686800" cy="3725699"/>
           </a:xfrm>
           <a:prstGeom prst="rect">
             <a:avLst/>
@@ -5659,6 +6749,66 @@
             <a:noAutofit/>
           </a:bodyPr>
           <a:lstStyle/>
+          <a:p>
+            <a:pPr rtl="0">
+              <a:spcBef>
+                <a:spcPts val="0"/>
+              </a:spcBef>
+              <a:buNone/>
+            </a:pPr>
+            <a:r>
+              <a:rPr lang="en"/>
+              <a:t>For C++                         For C#</a:t>
+            </a:r>
+          </a:p>
+          <a:p>
+            <a:pPr rtl="0">
+              <a:spcBef>
+                <a:spcPts val="0"/>
+              </a:spcBef>
+              <a:buNone/>
+            </a:pPr>
+            <a:r>
+              <a:t/>
+            </a:r>
+            <a:endParaRPr/>
+          </a:p>
+          <a:p>
+            <a:pPr rtl="0">
+              <a:spcBef>
+                <a:spcPts val="0"/>
+              </a:spcBef>
+              <a:buNone/>
+            </a:pPr>
+            <a:r>
+              <a:t/>
+            </a:r>
+            <a:endParaRPr/>
+          </a:p>
+          <a:p>
+            <a:pPr rtl="0">
+              <a:spcBef>
+                <a:spcPts val="0"/>
+              </a:spcBef>
+              <a:buNone/>
+            </a:pPr>
+            <a:r>
+              <a:t/>
+            </a:r>
+            <a:endParaRPr/>
+          </a:p>
+          <a:p>
+            <a:pPr rtl="0">
+              <a:spcBef>
+                <a:spcPts val="0"/>
+              </a:spcBef>
+              <a:buNone/>
+            </a:pPr>
+            <a:r>
+              <a:t/>
+            </a:r>
+            <a:endParaRPr/>
+          </a:p>
           <a:p>
             <a:pPr rtl="0">
               <a:spcBef>
@@ -5675,6 +6825,31 @@
               </a:rPr>
               <a:t>http://box2d.org/</a:t>
             </a:r>
+            <a:r>
+              <a:rPr lang="en"/>
+              <a:t>       </a:t>
+            </a:r>
+            <a:r>
+              <a:rPr lang="en" sz="2400" u="sng">
+                <a:solidFill>
+                  <a:schemeClr val="hlink"/>
+                </a:solidFill>
+                <a:hlinkClick r:id="rId4"/>
+              </a:rPr>
+              <a:t>https://farseerphysics.codeplex.com/</a:t>
+            </a:r>
+          </a:p>
+          <a:p>
+            <a:pPr rtl="0">
+              <a:spcBef>
+                <a:spcPts val="0"/>
+              </a:spcBef>
+              <a:buNone/>
+            </a:pPr>
+            <a:r>
+              <a:t/>
+            </a:r>
+            <a:endParaRPr/>
           </a:p>
           <a:p>
             <a:pPr>
@@ -5697,7 +6872,7 @@
           <p:nvPr/>
         </p:nvPicPr>
         <p:blipFill>
-          <a:blip r:embed="rId4">
+          <a:blip r:embed="rId5">
             <a:alphaModFix/>
           </a:blip>
           <a:stretch>
@@ -5708,6 +6883,34 @@
           <a:xfrm>
             <a:off x="595725" y="2068425"/>
             <a:ext cx="2003425" cy="1770474"/>
+          </a:xfrm>
+          <a:prstGeom prst="rect">
+            <a:avLst/>
+          </a:prstGeom>
+          <a:noFill/>
+          <a:ln>
+            <a:noFill/>
+          </a:ln>
+        </p:spPr>
+      </p:pic>
+      <p:pic>
+        <p:nvPicPr>
+          <p:cNvPr id="118" name="Shape 118"/>
+          <p:cNvPicPr preferRelativeResize="0"/>
+          <p:nvPr/>
+        </p:nvPicPr>
+        <p:blipFill>
+          <a:blip r:embed="rId6">
+            <a:alphaModFix/>
+          </a:blip>
+          <a:stretch>
+            <a:fillRect/>
+          </a:stretch>
+        </p:blipFill>
+        <p:spPr>
+          <a:xfrm>
+            <a:off x="3484047" y="1978187"/>
+            <a:ext cx="10445802" cy="1770475"/>
           </a:xfrm>
           <a:prstGeom prst="rect">
             <a:avLst/>
@@ -5734,7 +6937,7 @@
   <p:cSld>
     <p:spTree>
       <p:nvGrpSpPr>
-        <p:cNvPr id="121" name="Shape 121"/>
+        <p:cNvPr id="122" name="Shape 122"/>
         <p:cNvGrpSpPr/>
         <p:nvPr/>
       </p:nvGrpSpPr>
@@ -5748,7 +6951,7 @@
       </p:grpSpPr>
       <p:sp>
         <p:nvSpPr>
-          <p:cNvPr id="122" name="Shape 122"/>
+          <p:cNvPr id="123" name="Shape 123"/>
           <p:cNvSpPr txBox="1"/>
           <p:nvPr>
             <p:ph type="title"/>
@@ -5784,7 +6987,7 @@
       </p:sp>
       <p:pic>
         <p:nvPicPr>
-          <p:cNvPr id="123" name="Shape 123"/>
+          <p:cNvPr id="124" name="Shape 124"/>
           <p:cNvPicPr preferRelativeResize="0"/>
           <p:nvPr/>
         </p:nvPicPr>
@@ -5826,7 +7029,7 @@
   <p:cSld>
     <p:spTree>
       <p:nvGrpSpPr>
-        <p:cNvPr id="127" name="Shape 127"/>
+        <p:cNvPr id="128" name="Shape 128"/>
         <p:cNvGrpSpPr/>
         <p:nvPr/>
       </p:nvGrpSpPr>
@@ -5840,7 +7043,7 @@
       </p:grpSpPr>
       <p:sp>
         <p:nvSpPr>
-          <p:cNvPr id="128" name="Shape 128"/>
+          <p:cNvPr id="129" name="Shape 129"/>
           <p:cNvSpPr txBox="1"/>
           <p:nvPr>
             <p:ph type="title"/>
@@ -5869,47 +7072,39 @@
             </a:pPr>
             <a:r>
               <a:rPr lang="en"/>
-              <a:t>3D Physics</a:t>
+              <a:t>3D Physics: Jitter</a:t>
             </a:r>
           </a:p>
         </p:txBody>
       </p:sp>
-      <p:sp>
-        <p:nvSpPr>
-          <p:cNvPr id="129" name="Shape 129"/>
-          <p:cNvSpPr txBox="1"/>
-          <p:nvPr>
-            <p:ph idx="1" type="body"/>
-          </p:nvPr>
-        </p:nvSpPr>
-        <p:spPr>
-          <a:xfrm>
-            <a:off x="457200" y="1200150"/>
-            <a:ext cx="8229600" cy="3725699"/>
-          </a:xfrm>
-          <a:prstGeom prst="rect">
-            <a:avLst/>
-          </a:prstGeom>
-        </p:spPr>
-        <p:txBody>
-          <a:bodyPr anchorCtr="0" anchor="t" bIns="91425" lIns="91425" rIns="91425" tIns="91425">
-            <a:noAutofit/>
-          </a:bodyPr>
-          <a:lstStyle/>
-          <a:p>
-            <a:pPr>
-              <a:spcBef>
-                <a:spcPts val="0"/>
-              </a:spcBef>
-              <a:buNone/>
-            </a:pPr>
-            <a:r>
-              <a:rPr lang="en"/>
-              <a:t>Jitter</a:t>
-            </a:r>
-          </a:p>
-        </p:txBody>
-      </p:sp>
+      <p:pic>
+        <p:nvPicPr>
+          <p:cNvPr id="130" name="Shape 130"/>
+          <p:cNvPicPr preferRelativeResize="0"/>
+          <p:nvPr/>
+        </p:nvPicPr>
+        <p:blipFill>
+          <a:blip r:embed="rId3">
+            <a:alphaModFix/>
+          </a:blip>
+          <a:stretch>
+            <a:fillRect/>
+          </a:stretch>
+        </p:blipFill>
+        <p:spPr>
+          <a:xfrm>
+            <a:off x="2169725" y="2166625"/>
+            <a:ext cx="5193349" cy="1956400"/>
+          </a:xfrm>
+          <a:prstGeom prst="rect">
+            <a:avLst/>
+          </a:prstGeom>
+          <a:noFill/>
+          <a:ln>
+            <a:noFill/>
+          </a:ln>
+        </p:spPr>
+      </p:pic>
     </p:spTree>
   </p:cSld>
   <p:clrMapOvr>
@@ -5926,7 +7121,7 @@
   <p:cSld>
     <p:spTree>
       <p:nvGrpSpPr>
-        <p:cNvPr id="133" name="Shape 133"/>
+        <p:cNvPr id="134" name="Shape 134"/>
         <p:cNvGrpSpPr/>
         <p:nvPr/>
       </p:nvGrpSpPr>
@@ -5940,7 +7135,7 @@
       </p:grpSpPr>
       <p:sp>
         <p:nvSpPr>
-          <p:cNvPr id="134" name="Shape 134"/>
+          <p:cNvPr id="135" name="Shape 135"/>
           <p:cNvSpPr txBox="1"/>
           <p:nvPr>
             <p:ph type="title"/>
@@ -5961,7 +7156,7 @@
           </a:bodyPr>
           <a:lstStyle/>
           <a:p>
-            <a:pPr>
+            <a:pPr lvl="0" rtl="0">
               <a:spcBef>
                 <a:spcPts val="0"/>
               </a:spcBef>
@@ -5969,100 +7164,39 @@
             </a:pPr>
             <a:r>
               <a:rPr lang="en"/>
-              <a:t>Questions?</a:t>
+              <a:t>3D Physics: Bullet</a:t>
             </a:r>
           </a:p>
         </p:txBody>
       </p:sp>
-      <p:sp>
-        <p:nvSpPr>
-          <p:cNvPr id="135" name="Shape 135"/>
-          <p:cNvSpPr txBox="1"/>
-          <p:nvPr>
-            <p:ph idx="1" type="body"/>
-          </p:nvPr>
-        </p:nvSpPr>
-        <p:spPr>
-          <a:xfrm>
-            <a:off x="457200" y="1200150"/>
-            <a:ext cx="8229600" cy="3725699"/>
-          </a:xfrm>
-          <a:prstGeom prst="rect">
-            <a:avLst/>
-          </a:prstGeom>
-        </p:spPr>
-        <p:txBody>
-          <a:bodyPr anchorCtr="0" anchor="t" bIns="91425" lIns="91425" rIns="91425" tIns="91425">
-            <a:noAutofit/>
-          </a:bodyPr>
-          <a:lstStyle/>
-          <a:p>
-            <a:pPr rtl="0" algn="ctr">
-              <a:spcBef>
-                <a:spcPts val="0"/>
-              </a:spcBef>
-              <a:buNone/>
-            </a:pPr>
-            <a:r>
-              <a:t/>
-            </a:r>
-            <a:endParaRPr/>
-          </a:p>
-          <a:p>
-            <a:pPr rtl="0" algn="ctr">
-              <a:spcBef>
-                <a:spcPts val="0"/>
-              </a:spcBef>
-              <a:buNone/>
-            </a:pPr>
-            <a:r>
-              <a:t/>
-            </a:r>
-            <a:endParaRPr/>
-          </a:p>
-          <a:p>
-            <a:pPr rtl="0" algn="ctr">
-              <a:spcBef>
-                <a:spcPts val="0"/>
-              </a:spcBef>
-              <a:buNone/>
-            </a:pPr>
-            <a:r>
-              <a:rPr lang="en"/>
-              <a:t>All code and these slides are available at:</a:t>
-            </a:r>
-          </a:p>
-          <a:p>
-            <a:pPr rtl="0" algn="ctr">
-              <a:spcBef>
-                <a:spcPts val="0"/>
-              </a:spcBef>
-              <a:buNone/>
-            </a:pPr>
-            <a:r>
-              <a:rPr lang="en" sz="2400" u="sng">
-                <a:solidFill>
-                  <a:schemeClr val="hlink"/>
-                </a:solidFill>
-                <a:hlinkClick r:id="rId3"/>
-              </a:rPr>
-              <a:t>https://github.com/BenjaminNitschke/PhysicsCourse</a:t>
-            </a:r>
-          </a:p>
-          <a:p>
-            <a:pPr algn="ctr">
-              <a:spcBef>
-                <a:spcPts val="0"/>
-              </a:spcBef>
-              <a:buNone/>
-            </a:pPr>
-            <a:r>
-              <a:t/>
-            </a:r>
-            <a:endParaRPr sz="2400"/>
-          </a:p>
-        </p:txBody>
-      </p:sp>
+      <p:pic>
+        <p:nvPicPr>
+          <p:cNvPr id="136" name="Shape 136"/>
+          <p:cNvPicPr preferRelativeResize="0"/>
+          <p:nvPr/>
+        </p:nvPicPr>
+        <p:blipFill>
+          <a:blip r:embed="rId3">
+            <a:alphaModFix/>
+          </a:blip>
+          <a:stretch>
+            <a:fillRect/>
+          </a:stretch>
+        </p:blipFill>
+        <p:spPr>
+          <a:xfrm>
+            <a:off x="2089075" y="1959925"/>
+            <a:ext cx="5028400" cy="2059250"/>
+          </a:xfrm>
+          <a:prstGeom prst="rect">
+            <a:avLst/>
+          </a:prstGeom>
+          <a:noFill/>
+          <a:ln>
+            <a:noFill/>
+          </a:ln>
+        </p:spPr>
+      </p:pic>
     </p:spTree>
   </p:cSld>
   <p:clrMapOvr>
@@ -6079,7 +7213,7 @@
   <p:cSld>
     <p:spTree>
       <p:nvGrpSpPr>
-        <p:cNvPr id="139" name="Shape 139"/>
+        <p:cNvPr id="140" name="Shape 140"/>
         <p:cNvGrpSpPr/>
         <p:nvPr/>
       </p:nvGrpSpPr>
@@ -6093,7 +7227,7 @@
       </p:grpSpPr>
       <p:sp>
         <p:nvSpPr>
-          <p:cNvPr id="140" name="Shape 140"/>
+          <p:cNvPr id="141" name="Shape 141"/>
           <p:cNvSpPr txBox="1"/>
           <p:nvPr>
             <p:ph type="title"/>
@@ -6122,154 +7256,39 @@
             </a:pPr>
             <a:r>
               <a:rPr lang="en"/>
-              <a:t>Books</a:t>
+              <a:t>3D Physics: Havok </a:t>
             </a:r>
           </a:p>
         </p:txBody>
       </p:sp>
-      <p:sp>
-        <p:nvSpPr>
-          <p:cNvPr id="141" name="Shape 141"/>
-          <p:cNvSpPr txBox="1"/>
-          <p:nvPr>
-            <p:ph idx="1" type="body"/>
-          </p:nvPr>
-        </p:nvSpPr>
-        <p:spPr>
-          <a:xfrm>
-            <a:off x="457200" y="1200150"/>
-            <a:ext cx="8229600" cy="3725699"/>
-          </a:xfrm>
-          <a:prstGeom prst="rect">
-            <a:avLst/>
-          </a:prstGeom>
-        </p:spPr>
-        <p:txBody>
-          <a:bodyPr anchorCtr="0" anchor="t" bIns="91425" lIns="91425" rIns="91425" tIns="91425">
-            <a:noAutofit/>
-          </a:bodyPr>
-          <a:lstStyle/>
-          <a:p>
-            <a:pPr indent="-419100" lvl="0" marL="457200" rtl="0">
-              <a:spcBef>
-                <a:spcPts val="0"/>
-              </a:spcBef>
-              <a:buClr>
-                <a:schemeClr val="dk1"/>
-              </a:buClr>
-              <a:buSzPct val="100000"/>
-              <a:buFont typeface="Arial"/>
-              <a:buChar char="●"/>
-            </a:pPr>
-            <a:r>
-              <a:rPr lang="en"/>
-              <a:t>Effective TCP/IP Programming</a:t>
-            </a:r>
-          </a:p>
-          <a:p>
-            <a:pPr indent="-419100" lvl="0" marL="457200" rtl="0">
-              <a:spcBef>
-                <a:spcPts val="0"/>
-              </a:spcBef>
-              <a:buClr>
-                <a:schemeClr val="dk1"/>
-              </a:buClr>
-              <a:buSzPct val="100000"/>
-              <a:buFont typeface="Arial"/>
-              <a:buChar char="●"/>
-            </a:pPr>
-            <a:r>
-              <a:rPr lang="en"/>
-              <a:t>UNIX Network Programming - Volume 1</a:t>
-            </a:r>
-          </a:p>
-          <a:p>
-            <a:pPr indent="-419100" lvl="0" marL="457200" rtl="0">
-              <a:spcBef>
-                <a:spcPts val="0"/>
-              </a:spcBef>
-              <a:buClr>
-                <a:schemeClr val="dk1"/>
-              </a:buClr>
-              <a:buSzPct val="100000"/>
-              <a:buFont typeface="Arial"/>
-              <a:buChar char="●"/>
-            </a:pPr>
-            <a:r>
-              <a:rPr lang="en"/>
-              <a:t>Algorithms for network programming</a:t>
-            </a:r>
-          </a:p>
-          <a:p>
-            <a:pPr indent="-419100" lvl="0" marL="457200" rtl="0">
-              <a:spcBef>
-                <a:spcPts val="0"/>
-              </a:spcBef>
-              <a:buClr>
-                <a:schemeClr val="dk1"/>
-              </a:buClr>
-              <a:buSzPct val="100000"/>
-              <a:buFont typeface="Arial"/>
-              <a:buChar char="●"/>
-            </a:pPr>
-            <a:r>
-              <a:rPr lang="en"/>
-              <a:t>C++ Network Programming</a:t>
-            </a:r>
-          </a:p>
-          <a:p>
-            <a:pPr indent="-419100" lvl="0" marL="457200" rtl="0">
-              <a:spcBef>
-                <a:spcPts val="0"/>
-              </a:spcBef>
-              <a:buClr>
-                <a:schemeClr val="dk1"/>
-              </a:buClr>
-              <a:buSzPct val="100000"/>
-              <a:buFont typeface="Arial"/>
-              <a:buChar char="●"/>
-            </a:pPr>
-            <a:r>
-              <a:rPr lang="en"/>
-              <a:t>TCP/IP Sockets in C: Practical Guide for Programmers</a:t>
-            </a:r>
-          </a:p>
-          <a:p>
-            <a:pPr indent="-419100" lvl="0" marL="457200" rtl="0">
-              <a:spcBef>
-                <a:spcPts val="0"/>
-              </a:spcBef>
-              <a:buClr>
-                <a:schemeClr val="dk1"/>
-              </a:buClr>
-              <a:buSzPct val="100000"/>
-              <a:buFont typeface="Arial"/>
-              <a:buChar char="●"/>
-            </a:pPr>
-            <a:r>
-              <a:rPr lang="en"/>
-              <a:t>Game Programming Gems 1-8</a:t>
-            </a:r>
-          </a:p>
-          <a:p>
-            <a:pPr indent="-419100" lvl="0" marL="457200">
-              <a:spcBef>
-                <a:spcPts val="0"/>
-              </a:spcBef>
-              <a:buClr>
-                <a:schemeClr val="dk1"/>
-              </a:buClr>
-              <a:buSzPct val="100000"/>
-              <a:buFont typeface="Arial"/>
-              <a:buChar char="●"/>
-            </a:pPr>
-            <a:r>
-              <a:rPr lang="en"/>
-              <a:t>Clean Code (Robert C. Martin)</a:t>
-            </a:r>
-          </a:p>
-        </p:txBody>
-      </p:sp>
+      <p:pic>
+        <p:nvPicPr>
+          <p:cNvPr id="142" name="Shape 142"/>
+          <p:cNvPicPr preferRelativeResize="0"/>
+          <p:nvPr/>
+        </p:nvPicPr>
+        <p:blipFill>
+          <a:blip r:embed="rId3">
+            <a:alphaModFix/>
+          </a:blip>
+          <a:stretch>
+            <a:fillRect/>
+          </a:stretch>
+        </p:blipFill>
+        <p:spPr>
+          <a:xfrm>
+            <a:off x="2191062" y="2230775"/>
+            <a:ext cx="4761875" cy="1557624"/>
+          </a:xfrm>
+          <a:prstGeom prst="rect">
+            <a:avLst/>
+          </a:prstGeom>
+          <a:noFill/>
+          <a:ln>
+            <a:noFill/>
+          </a:ln>
+        </p:spPr>
+      </p:pic>
     </p:spTree>
   </p:cSld>
   <p:clrMapOvr>
@@ -6286,7 +7305,7 @@
   <p:cSld>
     <p:spTree>
       <p:nvGrpSpPr>
-        <p:cNvPr id="145" name="Shape 145"/>
+        <p:cNvPr id="146" name="Shape 146"/>
         <p:cNvGrpSpPr/>
         <p:nvPr/>
       </p:nvGrpSpPr>
@@ -6300,7 +7319,7 @@
       </p:grpSpPr>
       <p:sp>
         <p:nvSpPr>
-          <p:cNvPr id="146" name="Shape 146"/>
+          <p:cNvPr id="147" name="Shape 147"/>
           <p:cNvSpPr txBox="1"/>
           <p:nvPr>
             <p:ph type="title"/>
@@ -6329,149 +7348,131 @@
             </a:pPr>
             <a:r>
               <a:rPr lang="en"/>
-              <a:t>Networking Development Links</a:t>
+              <a:t>3D Physics: Ageia </a:t>
             </a:r>
           </a:p>
         </p:txBody>
       </p:sp>
-      <p:sp>
-        <p:nvSpPr>
-          <p:cNvPr id="147" name="Shape 147"/>
+      <p:pic>
+        <p:nvPicPr>
+          <p:cNvPr id="148" name="Shape 148"/>
+          <p:cNvPicPr preferRelativeResize="0"/>
+          <p:nvPr/>
+        </p:nvPicPr>
+        <p:blipFill>
+          <a:blip r:embed="rId3">
+            <a:alphaModFix/>
+          </a:blip>
+          <a:stretch>
+            <a:fillRect/>
+          </a:stretch>
+        </p:blipFill>
+        <p:spPr>
+          <a:xfrm>
+            <a:off x="2419950" y="2066850"/>
+            <a:ext cx="4304100" cy="2173574"/>
+          </a:xfrm>
+          <a:prstGeom prst="rect">
+            <a:avLst/>
+          </a:prstGeom>
+          <a:noFill/>
+          <a:ln>
+            <a:noFill/>
+          </a:ln>
+        </p:spPr>
+      </p:pic>
+    </p:spTree>
+  </p:cSld>
+  <p:clrMapOvr>
+    <a:masterClrMapping/>
+  </p:clrMapOvr>
+  <p:transition spd="slow">
+    <p:cut/>
+  </p:transition>
+</p:sld>
+</file>
+
+<file path=ppt/slides/slide19.xml><?xml version="1.0" encoding="utf-8"?>
+<p:sld xmlns:a="http://schemas.openxmlformats.org/drawingml/2006/main" xmlns:r="http://schemas.openxmlformats.org/officeDocument/2006/relationships" xmlns:mc="http://schemas.openxmlformats.org/markup-compatibility/2006" xmlns:mv="urn:schemas-microsoft-com:mac:vml" xmlns:p="http://schemas.openxmlformats.org/presentationml/2006/main" xmlns:c="http://schemas.openxmlformats.org/drawingml/2006/chart" xmlns:dgm="http://schemas.openxmlformats.org/drawingml/2006/diagram" xmlns:o="urn:schemas-microsoft-com:office:office" xmlns:v="urn:schemas-microsoft-com:vml" xmlns:pvml="urn:schemas-microsoft-com:office:powerpoint" xmlns:com="http://schemas.openxmlformats.org/drawingml/2006/compatibility" xmlns:p14="http://schemas.microsoft.com/office/powerpoint/2010/main">
+  <p:cSld>
+    <p:spTree>
+      <p:nvGrpSpPr>
+        <p:cNvPr id="152" name="Shape 152"/>
+        <p:cNvGrpSpPr/>
+        <p:nvPr/>
+      </p:nvGrpSpPr>
+      <p:grpSpPr>
+        <a:xfrm>
+          <a:off x="0" y="0"/>
+          <a:ext cx="0" cy="0"/>
+          <a:chOff x="0" y="0"/>
+          <a:chExt cx="0" cy="0"/>
+        </a:xfrm>
+      </p:grpSpPr>
+      <p:sp>
+        <p:nvSpPr>
+          <p:cNvPr id="153" name="Shape 153"/>
           <p:cNvSpPr txBox="1"/>
           <p:nvPr>
-            <p:ph idx="1" type="body"/>
-          </p:nvPr>
-        </p:nvSpPr>
-        <p:spPr>
-          <a:xfrm>
-            <a:off x="457200" y="1200150"/>
-            <a:ext cx="8229600" cy="3725699"/>
+            <p:ph type="title"/>
+          </p:nvPr>
+        </p:nvSpPr>
+        <p:spPr>
+          <a:xfrm>
+            <a:off x="457200" y="205978"/>
+            <a:ext cx="8229600" cy="857400"/>
           </a:xfrm>
           <a:prstGeom prst="rect">
             <a:avLst/>
           </a:prstGeom>
         </p:spPr>
         <p:txBody>
-          <a:bodyPr anchorCtr="0" anchor="t" bIns="91425" lIns="91425" rIns="91425" tIns="91425">
+          <a:bodyPr anchorCtr="0" anchor="b" bIns="91425" lIns="91425" rIns="91425" tIns="91425">
             <a:noAutofit/>
           </a:bodyPr>
           <a:lstStyle/>
           <a:p>
-            <a:pPr indent="-419100" lvl="0" marL="457200" rtl="0">
-              <a:spcBef>
-                <a:spcPts val="0"/>
-              </a:spcBef>
-              <a:buClr>
-                <a:schemeClr val="dk1"/>
-              </a:buClr>
-              <a:buSzPct val="100000"/>
-              <a:buFont typeface="Arial"/>
-              <a:buChar char="●"/>
-            </a:pPr>
-            <a:r>
-              <a:rPr lang="en" u="sng">
-                <a:solidFill>
-                  <a:schemeClr val="hlink"/>
-                </a:solidFill>
-                <a:hlinkClick r:id="rId3"/>
-              </a:rPr>
-              <a:t>http://www.hal-pc.org/~johnnie2/winsock.htm</a:t>
-            </a:r>
-          </a:p>
-          <a:p>
-            <a:pPr indent="-419100" lvl="0" marL="457200" rtl="0">
-              <a:spcBef>
-                <a:spcPts val="0"/>
-              </a:spcBef>
-              <a:buClr>
-                <a:schemeClr val="dk1"/>
-              </a:buClr>
-              <a:buSzPct val="100000"/>
-              <a:buFont typeface="Arial"/>
-              <a:buChar char="●"/>
-            </a:pPr>
-            <a:r>
-              <a:rPr lang="en" u="sng">
-                <a:solidFill>
-                  <a:schemeClr val="hlink"/>
-                </a:solidFill>
-                <a:hlinkClick r:id="rId4"/>
-              </a:rPr>
-              <a:t>http://tangentsoft.net/wskfaq/</a:t>
-            </a:r>
-          </a:p>
-          <a:p>
-            <a:pPr indent="-419100" lvl="0" marL="457200" rtl="0">
-              <a:spcBef>
-                <a:spcPts val="0"/>
-              </a:spcBef>
-              <a:buClr>
-                <a:schemeClr val="dk1"/>
-              </a:buClr>
-              <a:buSzPct val="100000"/>
-              <a:buFont typeface="Arial"/>
-              <a:buChar char="●"/>
+            <a:pPr lvl="0" rtl="0">
+              <a:spcBef>
+                <a:spcPts val="0"/>
+              </a:spcBef>
+              <a:buNone/>
             </a:pPr>
             <a:r>
               <a:rPr lang="en"/>
-              <a:t>Getting Started with Winsock: </a:t>
-            </a:r>
-            <a:r>
-              <a:rPr lang="en" u="sng">
-                <a:solidFill>
-                  <a:schemeClr val="hlink"/>
-                </a:solidFill>
-                <a:hlinkClick r:id="rId5"/>
-              </a:rPr>
-              <a:t>https://msdn.microsoft.com/en-us/library/windows/desktop/ms738545(v=vs.85).aspx</a:t>
-            </a:r>
-          </a:p>
-          <a:p>
-            <a:pPr indent="-419100" lvl="0" marL="457200" rtl="0">
-              <a:spcBef>
-                <a:spcPts val="0"/>
-              </a:spcBef>
-              <a:buClr>
-                <a:schemeClr val="dk1"/>
-              </a:buClr>
-              <a:buSzPct val="100000"/>
-              <a:buFont typeface="Arial"/>
-              <a:buChar char="●"/>
-            </a:pPr>
-            <a:r>
-              <a:rPr lang="en" u="sng">
-                <a:solidFill>
-                  <a:schemeClr val="hlink"/>
-                </a:solidFill>
-                <a:hlinkClick r:id="rId6"/>
-              </a:rPr>
-              <a:t>http://www.tutorialspoint.com/unix_sockets/</a:t>
-            </a:r>
-          </a:p>
-          <a:p>
-            <a:pPr indent="-419100" lvl="0" marL="457200" rtl="0">
-              <a:spcBef>
-                <a:spcPts val="0"/>
-              </a:spcBef>
-              <a:buClr>
-                <a:schemeClr val="dk1"/>
-              </a:buClr>
-              <a:buSzPct val="100000"/>
-              <a:buFont typeface="Arial"/>
-              <a:buChar char="●"/>
-            </a:pPr>
-            <a:r>
-              <a:rPr lang="en" u="sng">
-                <a:solidFill>
-                  <a:schemeClr val="hlink"/>
-                </a:solidFill>
-                <a:hlinkClick r:id="rId7"/>
-              </a:rPr>
-              <a:t>https://github.com/mafiya69/SharpChat</a:t>
+              <a:t>3D Physics: PhysX</a:t>
             </a:r>
           </a:p>
         </p:txBody>
       </p:sp>
+      <p:pic>
+        <p:nvPicPr>
+          <p:cNvPr id="154" name="Shape 154"/>
+          <p:cNvPicPr preferRelativeResize="0"/>
+          <p:nvPr/>
+        </p:nvPicPr>
+        <p:blipFill>
+          <a:blip r:embed="rId3">
+            <a:alphaModFix/>
+          </a:blip>
+          <a:stretch>
+            <a:fillRect/>
+          </a:stretch>
+        </p:blipFill>
+        <p:spPr>
+          <a:xfrm>
+            <a:off x="2044325" y="2038350"/>
+            <a:ext cx="5055349" cy="1769374"/>
+          </a:xfrm>
+          <a:prstGeom prst="rect">
+            <a:avLst/>
+          </a:prstGeom>
+          <a:noFill/>
+          <a:ln>
+            <a:noFill/>
+          </a:ln>
+        </p:spPr>
+      </p:pic>
     </p:spTree>
   </p:cSld>
   <p:clrMapOvr>
@@ -6600,6 +7601,1524 @@
           </a:ln>
         </p:spPr>
       </p:pic>
+    </p:spTree>
+  </p:cSld>
+  <p:clrMapOvr>
+    <a:masterClrMapping/>
+  </p:clrMapOvr>
+  <p:transition spd="slow">
+    <p:cut/>
+  </p:transition>
+</p:sld>
+</file>
+
+<file path=ppt/slides/slide20.xml><?xml version="1.0" encoding="utf-8"?>
+<p:sld xmlns:a="http://schemas.openxmlformats.org/drawingml/2006/main" xmlns:r="http://schemas.openxmlformats.org/officeDocument/2006/relationships" xmlns:mc="http://schemas.openxmlformats.org/markup-compatibility/2006" xmlns:mv="urn:schemas-microsoft-com:mac:vml" xmlns:p="http://schemas.openxmlformats.org/presentationml/2006/main" xmlns:c="http://schemas.openxmlformats.org/drawingml/2006/chart" xmlns:dgm="http://schemas.openxmlformats.org/drawingml/2006/diagram" xmlns:o="urn:schemas-microsoft-com:office:office" xmlns:v="urn:schemas-microsoft-com:vml" xmlns:pvml="urn:schemas-microsoft-com:office:powerpoint" xmlns:com="http://schemas.openxmlformats.org/drawingml/2006/compatibility" xmlns:p14="http://schemas.microsoft.com/office/powerpoint/2010/main">
+  <p:cSld>
+    <p:spTree>
+      <p:nvGrpSpPr>
+        <p:cNvPr id="158" name="Shape 158"/>
+        <p:cNvGrpSpPr/>
+        <p:nvPr/>
+      </p:nvGrpSpPr>
+      <p:grpSpPr>
+        <a:xfrm>
+          <a:off x="0" y="0"/>
+          <a:ext cx="0" cy="0"/>
+          <a:chOff x="0" y="0"/>
+          <a:chExt cx="0" cy="0"/>
+        </a:xfrm>
+      </p:grpSpPr>
+      <p:sp>
+        <p:nvSpPr>
+          <p:cNvPr id="159" name="Shape 159"/>
+          <p:cNvSpPr txBox="1"/>
+          <p:nvPr>
+            <p:ph type="title"/>
+          </p:nvPr>
+        </p:nvSpPr>
+        <p:spPr>
+          <a:xfrm>
+            <a:off x="457200" y="205978"/>
+            <a:ext cx="8229600" cy="857400"/>
+          </a:xfrm>
+          <a:prstGeom prst="rect">
+            <a:avLst/>
+          </a:prstGeom>
+        </p:spPr>
+        <p:txBody>
+          <a:bodyPr anchorCtr="0" anchor="b" bIns="91425" lIns="91425" rIns="91425" tIns="91425">
+            <a:noAutofit/>
+          </a:bodyPr>
+          <a:lstStyle/>
+          <a:p>
+            <a:pPr lvl="0" rtl="0">
+              <a:spcBef>
+                <a:spcPts val="0"/>
+              </a:spcBef>
+              <a:buNone/>
+            </a:pPr>
+            <a:r>
+              <a:rPr lang="en"/>
+              <a:t>Getting 3D Up and Running</a:t>
+            </a:r>
+          </a:p>
+        </p:txBody>
+      </p:sp>
+      <p:sp>
+        <p:nvSpPr>
+          <p:cNvPr id="160" name="Shape 160"/>
+          <p:cNvSpPr txBox="1"/>
+          <p:nvPr>
+            <p:ph idx="1" type="body"/>
+          </p:nvPr>
+        </p:nvSpPr>
+        <p:spPr>
+          <a:xfrm>
+            <a:off x="457200" y="1200150"/>
+            <a:ext cx="8229600" cy="3725699"/>
+          </a:xfrm>
+          <a:prstGeom prst="rect">
+            <a:avLst/>
+          </a:prstGeom>
+        </p:spPr>
+        <p:txBody>
+          <a:bodyPr anchorCtr="0" anchor="t" bIns="91425" lIns="91425" rIns="91425" tIns="91425">
+            <a:noAutofit/>
+          </a:bodyPr>
+          <a:lstStyle/>
+          <a:p>
+            <a:pPr indent="-419100" lvl="0" marL="457200" rtl="0">
+              <a:spcBef>
+                <a:spcPts val="0"/>
+              </a:spcBef>
+              <a:buClr>
+                <a:schemeClr val="dk1"/>
+              </a:buClr>
+              <a:buSzPct val="100000"/>
+              <a:buFont typeface="Arial"/>
+              <a:buChar char="●"/>
+            </a:pPr>
+            <a:r>
+              <a:rPr lang="en"/>
+              <a:t>Using our C# GraphicsEngine</a:t>
+            </a:r>
+          </a:p>
+          <a:p>
+            <a:pPr indent="-419100" lvl="0" marL="457200" rtl="0">
+              <a:spcBef>
+                <a:spcPts val="0"/>
+              </a:spcBef>
+              <a:buClr>
+                <a:schemeClr val="dk1"/>
+              </a:buClr>
+              <a:buSzPct val="100000"/>
+              <a:buFont typeface="Arial"/>
+              <a:buChar char="●"/>
+            </a:pPr>
+            <a:r>
+              <a:rPr lang="en"/>
+              <a:t>Enabling 3D once again</a:t>
+            </a:r>
+          </a:p>
+          <a:p>
+            <a:pPr indent="-419100" lvl="0" marL="457200" rtl="0">
+              <a:spcBef>
+                <a:spcPts val="0"/>
+              </a:spcBef>
+              <a:buClr>
+                <a:schemeClr val="dk1"/>
+              </a:buClr>
+              <a:buSzPct val="100000"/>
+              <a:buFont typeface="Arial"/>
+              <a:buChar char="●"/>
+            </a:pPr>
+            <a:r>
+              <a:rPr lang="en"/>
+              <a:t>Render many boxes (no physics)</a:t>
+            </a:r>
+          </a:p>
+          <a:p>
+            <a:pPr indent="-419100" lvl="0" marL="457200" rtl="0">
+              <a:spcBef>
+                <a:spcPts val="0"/>
+              </a:spcBef>
+              <a:buClr>
+                <a:schemeClr val="dk1"/>
+              </a:buClr>
+              <a:buSzPct val="100000"/>
+              <a:buFont typeface="Arial"/>
+              <a:buChar char="●"/>
+            </a:pPr>
+            <a:r>
+              <a:rPr lang="en"/>
+              <a:t>Using Matrix for everything</a:t>
+            </a:r>
+          </a:p>
+          <a:p>
+            <a:pPr indent="-381000" lvl="1" marL="914400" rtl="0">
+              <a:spcBef>
+                <a:spcPts val="0"/>
+              </a:spcBef>
+              <a:buClr>
+                <a:schemeClr val="dk1"/>
+              </a:buClr>
+              <a:buSzPct val="80000"/>
+              <a:buFont typeface="Courier New"/>
+              <a:buChar char="o"/>
+            </a:pPr>
+            <a:r>
+              <a:rPr lang="en"/>
+              <a:t>transformations</a:t>
+            </a:r>
+          </a:p>
+          <a:p>
+            <a:pPr indent="-381000" lvl="1" marL="914400" rtl="0">
+              <a:spcBef>
+                <a:spcPts val="0"/>
+              </a:spcBef>
+              <a:buClr>
+                <a:schemeClr val="dk1"/>
+              </a:buClr>
+              <a:buSzPct val="80000"/>
+              <a:buFont typeface="Courier New"/>
+              <a:buChar char="o"/>
+            </a:pPr>
+            <a:r>
+              <a:rPr lang="en"/>
+              <a:t>scaling</a:t>
+            </a:r>
+          </a:p>
+          <a:p>
+            <a:pPr indent="-381000" lvl="1" marL="914400" rtl="0">
+              <a:spcBef>
+                <a:spcPts val="0"/>
+              </a:spcBef>
+              <a:buClr>
+                <a:schemeClr val="dk1"/>
+              </a:buClr>
+              <a:buSzPct val="80000"/>
+              <a:buFont typeface="Courier New"/>
+              <a:buChar char="o"/>
+            </a:pPr>
+            <a:r>
+              <a:rPr lang="en"/>
+              <a:t>rotation</a:t>
+            </a:r>
+          </a:p>
+        </p:txBody>
+      </p:sp>
+    </p:spTree>
+  </p:cSld>
+  <p:clrMapOvr>
+    <a:masterClrMapping/>
+  </p:clrMapOvr>
+  <p:transition spd="slow">
+    <p:cut/>
+  </p:transition>
+</p:sld>
+</file>
+
+<file path=ppt/slides/slide21.xml><?xml version="1.0" encoding="utf-8"?>
+<p:sld xmlns:a="http://schemas.openxmlformats.org/drawingml/2006/main" xmlns:r="http://schemas.openxmlformats.org/officeDocument/2006/relationships" xmlns:mc="http://schemas.openxmlformats.org/markup-compatibility/2006" xmlns:mv="urn:schemas-microsoft-com:mac:vml" xmlns:p="http://schemas.openxmlformats.org/presentationml/2006/main" xmlns:c="http://schemas.openxmlformats.org/drawingml/2006/chart" xmlns:dgm="http://schemas.openxmlformats.org/drawingml/2006/diagram" xmlns:o="urn:schemas-microsoft-com:office:office" xmlns:v="urn:schemas-microsoft-com:vml" xmlns:pvml="urn:schemas-microsoft-com:office:powerpoint" xmlns:com="http://schemas.openxmlformats.org/drawingml/2006/compatibility" xmlns:p14="http://schemas.microsoft.com/office/powerpoint/2010/main">
+  <p:cSld>
+    <p:spTree>
+      <p:nvGrpSpPr>
+        <p:cNvPr id="164" name="Shape 164"/>
+        <p:cNvGrpSpPr/>
+        <p:nvPr/>
+      </p:nvGrpSpPr>
+      <p:grpSpPr>
+        <a:xfrm>
+          <a:off x="0" y="0"/>
+          <a:ext cx="0" cy="0"/>
+          <a:chOff x="0" y="0"/>
+          <a:chExt cx="0" cy="0"/>
+        </a:xfrm>
+      </p:grpSpPr>
+      <p:sp>
+        <p:nvSpPr>
+          <p:cNvPr id="165" name="Shape 165"/>
+          <p:cNvSpPr txBox="1"/>
+          <p:nvPr>
+            <p:ph type="title"/>
+          </p:nvPr>
+        </p:nvSpPr>
+        <p:spPr>
+          <a:xfrm>
+            <a:off x="457200" y="205978"/>
+            <a:ext cx="8229600" cy="857400"/>
+          </a:xfrm>
+          <a:prstGeom prst="rect">
+            <a:avLst/>
+          </a:prstGeom>
+        </p:spPr>
+        <p:txBody>
+          <a:bodyPr anchorCtr="0" anchor="b" bIns="91425" lIns="91425" rIns="91425" tIns="91425">
+            <a:noAutofit/>
+          </a:bodyPr>
+          <a:lstStyle/>
+          <a:p>
+            <a:pPr lvl="0" rtl="0">
+              <a:spcBef>
+                <a:spcPts val="0"/>
+              </a:spcBef>
+              <a:buNone/>
+            </a:pPr>
+            <a:r>
+              <a:rPr lang="en"/>
+              <a:t>Integrating Jitter for 3D Physics</a:t>
+            </a:r>
+          </a:p>
+        </p:txBody>
+      </p:sp>
+      <p:sp>
+        <p:nvSpPr>
+          <p:cNvPr id="166" name="Shape 166"/>
+          <p:cNvSpPr txBox="1"/>
+          <p:nvPr>
+            <p:ph idx="1" type="body"/>
+          </p:nvPr>
+        </p:nvSpPr>
+        <p:spPr>
+          <a:xfrm>
+            <a:off x="457200" y="1200150"/>
+            <a:ext cx="8229600" cy="3725699"/>
+          </a:xfrm>
+          <a:prstGeom prst="rect">
+            <a:avLst/>
+          </a:prstGeom>
+        </p:spPr>
+        <p:txBody>
+          <a:bodyPr anchorCtr="0" anchor="t" bIns="91425" lIns="91425" rIns="91425" tIns="91425">
+            <a:noAutofit/>
+          </a:bodyPr>
+          <a:lstStyle/>
+          <a:p>
+            <a:pPr indent="-419100" lvl="0" marL="457200" rtl="0">
+              <a:spcBef>
+                <a:spcPts val="0"/>
+              </a:spcBef>
+              <a:buClr>
+                <a:schemeClr val="dk1"/>
+              </a:buClr>
+              <a:buSzPct val="100000"/>
+              <a:buFont typeface="Arial"/>
+              <a:buChar char="●"/>
+            </a:pPr>
+            <a:r>
+              <a:rPr lang="en" u="sng">
+                <a:solidFill>
+                  <a:schemeClr val="hlink"/>
+                </a:solidFill>
+                <a:hlinkClick r:id="rId3"/>
+              </a:rPr>
+              <a:t>https://code.google.com/p/jitterphysics/</a:t>
+            </a:r>
+          </a:p>
+          <a:p>
+            <a:pPr indent="-419100" lvl="0" marL="457200" rtl="0">
+              <a:spcBef>
+                <a:spcPts val="0"/>
+              </a:spcBef>
+              <a:buClr>
+                <a:schemeClr val="dk1"/>
+              </a:buClr>
+              <a:buSzPct val="100000"/>
+              <a:buFont typeface="Arial"/>
+              <a:buChar char="●"/>
+            </a:pPr>
+            <a:r>
+              <a:rPr lang="en"/>
+              <a:t>Very nice and fast little library</a:t>
+            </a:r>
+          </a:p>
+          <a:p>
+            <a:pPr indent="-419100" lvl="0" marL="457200" rtl="0">
+              <a:spcBef>
+                <a:spcPts val="0"/>
+              </a:spcBef>
+              <a:buClr>
+                <a:schemeClr val="dk1"/>
+              </a:buClr>
+              <a:buSzPct val="100000"/>
+              <a:buFont typeface="Arial"/>
+              <a:buChar char="●"/>
+            </a:pPr>
+            <a:r>
+              <a:rPr lang="en"/>
+              <a:t>Predecessor was JigLib</a:t>
+            </a:r>
+          </a:p>
+          <a:p>
+            <a:pPr indent="-381000" lvl="1" marL="914400" rtl="0">
+              <a:spcBef>
+                <a:spcPts val="0"/>
+              </a:spcBef>
+              <a:buClr>
+                <a:schemeClr val="dk1"/>
+              </a:buClr>
+              <a:buSzPct val="80000"/>
+              <a:buFont typeface="Courier New"/>
+              <a:buChar char="o"/>
+            </a:pPr>
+            <a:r>
+              <a:rPr lang="en"/>
+              <a:t>very unorganized, but still useful in the olden days</a:t>
+            </a:r>
+          </a:p>
+          <a:p>
+            <a:pPr indent="-419100" lvl="0" marL="457200" marR="0" rtl="0" algn="l">
+              <a:lnSpc>
+                <a:spcPct val="100000"/>
+              </a:lnSpc>
+              <a:spcBef>
+                <a:spcPts val="600"/>
+              </a:spcBef>
+              <a:spcAft>
+                <a:spcPts val="0"/>
+              </a:spcAft>
+              <a:buClr>
+                <a:schemeClr val="dk1"/>
+              </a:buClr>
+              <a:buSzPct val="100000"/>
+              <a:buFont typeface="Arial"/>
+              <a:buChar char="●"/>
+            </a:pPr>
+            <a:r>
+              <a:rPr lang="en"/>
+              <a:t>Let’s integrate it and add more features to our 3D engine</a:t>
+            </a:r>
+          </a:p>
+        </p:txBody>
+      </p:sp>
+    </p:spTree>
+  </p:cSld>
+  <p:clrMapOvr>
+    <a:masterClrMapping/>
+  </p:clrMapOvr>
+  <p:transition spd="slow">
+    <p:cut/>
+  </p:transition>
+</p:sld>
+</file>
+
+<file path=ppt/slides/slide22.xml><?xml version="1.0" encoding="utf-8"?>
+<p:sld xmlns:a="http://schemas.openxmlformats.org/drawingml/2006/main" xmlns:r="http://schemas.openxmlformats.org/officeDocument/2006/relationships" xmlns:mc="http://schemas.openxmlformats.org/markup-compatibility/2006" xmlns:mv="urn:schemas-microsoft-com:mac:vml" xmlns:p="http://schemas.openxmlformats.org/presentationml/2006/main" xmlns:c="http://schemas.openxmlformats.org/drawingml/2006/chart" xmlns:dgm="http://schemas.openxmlformats.org/drawingml/2006/diagram" xmlns:o="urn:schemas-microsoft-com:office:office" xmlns:v="urn:schemas-microsoft-com:vml" xmlns:pvml="urn:schemas-microsoft-com:office:powerpoint" xmlns:com="http://schemas.openxmlformats.org/drawingml/2006/compatibility" xmlns:p14="http://schemas.microsoft.com/office/powerpoint/2010/main">
+  <p:cSld>
+    <p:spTree>
+      <p:nvGrpSpPr>
+        <p:cNvPr id="170" name="Shape 170"/>
+        <p:cNvGrpSpPr/>
+        <p:nvPr/>
+      </p:nvGrpSpPr>
+      <p:grpSpPr>
+        <a:xfrm>
+          <a:off x="0" y="0"/>
+          <a:ext cx="0" cy="0"/>
+          <a:chOff x="0" y="0"/>
+          <a:chExt cx="0" cy="0"/>
+        </a:xfrm>
+      </p:grpSpPr>
+      <p:sp>
+        <p:nvSpPr>
+          <p:cNvPr id="171" name="Shape 171"/>
+          <p:cNvSpPr txBox="1"/>
+          <p:nvPr>
+            <p:ph type="title"/>
+          </p:nvPr>
+        </p:nvSpPr>
+        <p:spPr>
+          <a:xfrm>
+            <a:off x="457200" y="205978"/>
+            <a:ext cx="8229600" cy="857400"/>
+          </a:xfrm>
+          <a:prstGeom prst="rect">
+            <a:avLst/>
+          </a:prstGeom>
+        </p:spPr>
+        <p:txBody>
+          <a:bodyPr anchorCtr="0" anchor="b" bIns="91425" lIns="91425" rIns="91425" tIns="91425">
+            <a:noAutofit/>
+          </a:bodyPr>
+          <a:lstStyle/>
+          <a:p>
+            <a:pPr>
+              <a:spcBef>
+                <a:spcPts val="0"/>
+              </a:spcBef>
+              <a:buNone/>
+            </a:pPr>
+            <a:r>
+              <a:rPr lang="en"/>
+              <a:t>Raycast</a:t>
+            </a:r>
+          </a:p>
+        </p:txBody>
+      </p:sp>
+      <p:sp>
+        <p:nvSpPr>
+          <p:cNvPr id="172" name="Shape 172"/>
+          <p:cNvSpPr txBox="1"/>
+          <p:nvPr>
+            <p:ph idx="1" type="body"/>
+          </p:nvPr>
+        </p:nvSpPr>
+        <p:spPr>
+          <a:xfrm>
+            <a:off x="457200" y="1200150"/>
+            <a:ext cx="8229600" cy="3725699"/>
+          </a:xfrm>
+          <a:prstGeom prst="rect">
+            <a:avLst/>
+          </a:prstGeom>
+        </p:spPr>
+        <p:txBody>
+          <a:bodyPr anchorCtr="0" anchor="t" bIns="91425" lIns="91425" rIns="91425" tIns="91425">
+            <a:noAutofit/>
+          </a:bodyPr>
+          <a:lstStyle/>
+          <a:p>
+            <a:pPr>
+              <a:spcBef>
+                <a:spcPts val="0"/>
+              </a:spcBef>
+              <a:buNone/>
+            </a:pPr>
+            <a:r>
+              <a:rPr lang="en"/>
+              <a:t>3D to 2D can be reversed via Matrix.Invert</a:t>
+            </a:r>
+          </a:p>
+        </p:txBody>
+      </p:sp>
+      <p:pic>
+        <p:nvPicPr>
+          <p:cNvPr id="173" name="Shape 173"/>
+          <p:cNvPicPr preferRelativeResize="0"/>
+          <p:nvPr/>
+        </p:nvPicPr>
+        <p:blipFill>
+          <a:blip r:embed="rId3">
+            <a:alphaModFix/>
+          </a:blip>
+          <a:stretch>
+            <a:fillRect/>
+          </a:stretch>
+        </p:blipFill>
+        <p:spPr>
+          <a:xfrm>
+            <a:off x="805975" y="1748625"/>
+            <a:ext cx="7380150" cy="3394875"/>
+          </a:xfrm>
+          <a:prstGeom prst="rect">
+            <a:avLst/>
+          </a:prstGeom>
+          <a:noFill/>
+          <a:ln>
+            <a:noFill/>
+          </a:ln>
+        </p:spPr>
+      </p:pic>
+    </p:spTree>
+  </p:cSld>
+  <p:clrMapOvr>
+    <a:masterClrMapping/>
+  </p:clrMapOvr>
+  <p:transition spd="slow">
+    <p:cut/>
+  </p:transition>
+</p:sld>
+</file>
+
+<file path=ppt/slides/slide23.xml><?xml version="1.0" encoding="utf-8"?>
+<p:sld xmlns:a="http://schemas.openxmlformats.org/drawingml/2006/main" xmlns:r="http://schemas.openxmlformats.org/officeDocument/2006/relationships" xmlns:mc="http://schemas.openxmlformats.org/markup-compatibility/2006" xmlns:mv="urn:schemas-microsoft-com:mac:vml" xmlns:p="http://schemas.openxmlformats.org/presentationml/2006/main" xmlns:c="http://schemas.openxmlformats.org/drawingml/2006/chart" xmlns:dgm="http://schemas.openxmlformats.org/drawingml/2006/diagram" xmlns:o="urn:schemas-microsoft-com:office:office" xmlns:v="urn:schemas-microsoft-com:vml" xmlns:pvml="urn:schemas-microsoft-com:office:powerpoint" xmlns:com="http://schemas.openxmlformats.org/drawingml/2006/compatibility" xmlns:p14="http://schemas.microsoft.com/office/powerpoint/2010/main">
+  <p:cSld>
+    <p:spTree>
+      <p:nvGrpSpPr>
+        <p:cNvPr id="177" name="Shape 177"/>
+        <p:cNvGrpSpPr/>
+        <p:nvPr/>
+      </p:nvGrpSpPr>
+      <p:grpSpPr>
+        <a:xfrm>
+          <a:off x="0" y="0"/>
+          <a:ext cx="0" cy="0"/>
+          <a:chOff x="0" y="0"/>
+          <a:chExt cx="0" cy="0"/>
+        </a:xfrm>
+      </p:grpSpPr>
+      <p:sp>
+        <p:nvSpPr>
+          <p:cNvPr id="178" name="Shape 178"/>
+          <p:cNvSpPr txBox="1"/>
+          <p:nvPr>
+            <p:ph type="title"/>
+          </p:nvPr>
+        </p:nvSpPr>
+        <p:spPr>
+          <a:xfrm>
+            <a:off x="457200" y="205978"/>
+            <a:ext cx="8229600" cy="857400"/>
+          </a:xfrm>
+          <a:prstGeom prst="rect">
+            <a:avLst/>
+          </a:prstGeom>
+        </p:spPr>
+        <p:txBody>
+          <a:bodyPr anchorCtr="0" anchor="b" bIns="91425" lIns="91425" rIns="91425" tIns="91425">
+            <a:noAutofit/>
+          </a:bodyPr>
+          <a:lstStyle/>
+          <a:p>
+            <a:pPr>
+              <a:spcBef>
+                <a:spcPts val="0"/>
+              </a:spcBef>
+              <a:buNone/>
+            </a:pPr>
+            <a:r>
+              <a:rPr lang="en"/>
+              <a:t>PhysX</a:t>
+            </a:r>
+          </a:p>
+        </p:txBody>
+      </p:sp>
+      <p:sp>
+        <p:nvSpPr>
+          <p:cNvPr id="179" name="Shape 179"/>
+          <p:cNvSpPr txBox="1"/>
+          <p:nvPr>
+            <p:ph idx="1" type="body"/>
+          </p:nvPr>
+        </p:nvSpPr>
+        <p:spPr>
+          <a:xfrm>
+            <a:off x="457200" y="1200150"/>
+            <a:ext cx="8555999" cy="3725699"/>
+          </a:xfrm>
+          <a:prstGeom prst="rect">
+            <a:avLst/>
+          </a:prstGeom>
+        </p:spPr>
+        <p:txBody>
+          <a:bodyPr anchorCtr="0" anchor="t" bIns="91425" lIns="91425" rIns="91425" tIns="91425">
+            <a:noAutofit/>
+          </a:bodyPr>
+          <a:lstStyle/>
+          <a:p>
+            <a:pPr indent="-419100" lvl="0" marL="457200" rtl="0">
+              <a:spcBef>
+                <a:spcPts val="0"/>
+              </a:spcBef>
+              <a:buClr>
+                <a:schemeClr val="dk1"/>
+              </a:buClr>
+              <a:buSzPct val="100000"/>
+              <a:buFont typeface="Arial"/>
+              <a:buChar char="●"/>
+            </a:pPr>
+            <a:r>
+              <a:rPr lang="en" u="sng">
+                <a:solidFill>
+                  <a:schemeClr val="hlink"/>
+                </a:solidFill>
+                <a:hlinkClick r:id="rId3"/>
+              </a:rPr>
+              <a:t>https://developer.nvidia.com/physx-sdk</a:t>
+            </a:r>
+          </a:p>
+          <a:p>
+            <a:pPr indent="-419100" lvl="0" marL="457200" rtl="0">
+              <a:spcBef>
+                <a:spcPts val="0"/>
+              </a:spcBef>
+              <a:buClr>
+                <a:schemeClr val="dk1"/>
+              </a:buClr>
+              <a:buSzPct val="100000"/>
+              <a:buFont typeface="Arial"/>
+              <a:buChar char="●"/>
+            </a:pPr>
+            <a:r>
+              <a:rPr lang="en"/>
+              <a:t>Platforms</a:t>
+            </a:r>
+          </a:p>
+          <a:p>
+            <a:pPr indent="-381000" lvl="1" marL="914400" rtl="0">
+              <a:spcBef>
+                <a:spcPts val="0"/>
+              </a:spcBef>
+              <a:buClr>
+                <a:schemeClr val="dk1"/>
+              </a:buClr>
+              <a:buSzPct val="80000"/>
+              <a:buFont typeface="Courier New"/>
+              <a:buChar char="o"/>
+            </a:pPr>
+            <a:r>
+              <a:rPr lang="en"/>
+              <a:t>Win, OSX, Linux, XBOX®, PlayStation®, Android, ioS</a:t>
+            </a:r>
+          </a:p>
+          <a:p>
+            <a:pPr indent="-419100" lvl="0" marL="457200" rtl="0">
+              <a:spcBef>
+                <a:spcPts val="0"/>
+              </a:spcBef>
+              <a:buClr>
+                <a:schemeClr val="dk1"/>
+              </a:buClr>
+              <a:buSzPct val="100000"/>
+              <a:buFont typeface="Arial"/>
+              <a:buChar char="●"/>
+            </a:pPr>
+            <a:r>
+              <a:rPr lang="en"/>
+              <a:t>Engines</a:t>
+            </a:r>
+          </a:p>
+          <a:p>
+            <a:pPr indent="-381000" lvl="1" marL="914400" rtl="0">
+              <a:spcBef>
+                <a:spcPts val="0"/>
+              </a:spcBef>
+              <a:buClr>
+                <a:schemeClr val="dk1"/>
+              </a:buClr>
+              <a:buSzPct val="80000"/>
+              <a:buFont typeface="Courier New"/>
+              <a:buChar char="o"/>
+            </a:pPr>
+            <a:r>
+              <a:rPr lang="en"/>
+              <a:t>Unreal® Engine 3, Unreal® Engine 4, Unity®</a:t>
+            </a:r>
+          </a:p>
+          <a:p>
+            <a:pPr indent="-419100" lvl="0" marL="457200" rtl="0">
+              <a:spcBef>
+                <a:spcPts val="0"/>
+              </a:spcBef>
+              <a:buClr>
+                <a:schemeClr val="dk1"/>
+              </a:buClr>
+              <a:buSzPct val="100000"/>
+              <a:buFont typeface="Arial"/>
+              <a:buChar char="●"/>
+            </a:pPr>
+            <a:r>
+              <a:rPr lang="en"/>
+              <a:t>Tools	</a:t>
+            </a:r>
+          </a:p>
+          <a:p>
+            <a:pPr indent="-381000" lvl="1" marL="914400" rtl="0">
+              <a:spcBef>
+                <a:spcPts val="0"/>
+              </a:spcBef>
+              <a:buClr>
+                <a:schemeClr val="dk1"/>
+              </a:buClr>
+              <a:buSzPct val="80000"/>
+              <a:buFont typeface="Courier New"/>
+              <a:buChar char="o"/>
+            </a:pPr>
+            <a:r>
+              <a:rPr lang="en"/>
+              <a:t>PhysX Visual Debugger</a:t>
+            </a:r>
+          </a:p>
+          <a:p>
+            <a:pPr indent="-381000" lvl="1" marL="914400" rtl="0">
+              <a:spcBef>
+                <a:spcPts val="0"/>
+              </a:spcBef>
+              <a:buClr>
+                <a:schemeClr val="dk1"/>
+              </a:buClr>
+              <a:buSzPct val="80000"/>
+              <a:buFont typeface="Courier New"/>
+              <a:buChar char="o"/>
+            </a:pPr>
+            <a:r>
+              <a:rPr lang="en"/>
+              <a:t>Maya DCC Plug-In</a:t>
+            </a:r>
+          </a:p>
+          <a:p>
+            <a:pPr indent="-381000" lvl="1" marL="914400" rtl="0">
+              <a:spcBef>
+                <a:spcPts val="0"/>
+              </a:spcBef>
+              <a:buClr>
+                <a:schemeClr val="dk1"/>
+              </a:buClr>
+              <a:buSzPct val="80000"/>
+              <a:buFont typeface="Courier New"/>
+              <a:buChar char="o"/>
+            </a:pPr>
+            <a:r>
+              <a:rPr lang="en"/>
+              <a:t>3D Studio MAX DCC Plug-In</a:t>
+            </a:r>
+          </a:p>
+        </p:txBody>
+      </p:sp>
+    </p:spTree>
+  </p:cSld>
+  <p:clrMapOvr>
+    <a:masterClrMapping/>
+  </p:clrMapOvr>
+  <p:transition spd="slow">
+    <p:cut/>
+  </p:transition>
+</p:sld>
+</file>
+
+<file path=ppt/slides/slide24.xml><?xml version="1.0" encoding="utf-8"?>
+<p:sld xmlns:a="http://schemas.openxmlformats.org/drawingml/2006/main" xmlns:r="http://schemas.openxmlformats.org/officeDocument/2006/relationships" xmlns:mc="http://schemas.openxmlformats.org/markup-compatibility/2006" xmlns:mv="urn:schemas-microsoft-com:mac:vml" xmlns:p="http://schemas.openxmlformats.org/presentationml/2006/main" xmlns:c="http://schemas.openxmlformats.org/drawingml/2006/chart" xmlns:dgm="http://schemas.openxmlformats.org/drawingml/2006/diagram" xmlns:o="urn:schemas-microsoft-com:office:office" xmlns:v="urn:schemas-microsoft-com:vml" xmlns:pvml="urn:schemas-microsoft-com:office:powerpoint" xmlns:com="http://schemas.openxmlformats.org/drawingml/2006/compatibility" xmlns:p14="http://schemas.microsoft.com/office/powerpoint/2010/main">
+  <p:cSld>
+    <p:spTree>
+      <p:nvGrpSpPr>
+        <p:cNvPr id="183" name="Shape 183"/>
+        <p:cNvGrpSpPr/>
+        <p:nvPr/>
+      </p:nvGrpSpPr>
+      <p:grpSpPr>
+        <a:xfrm>
+          <a:off x="0" y="0"/>
+          <a:ext cx="0" cy="0"/>
+          <a:chOff x="0" y="0"/>
+          <a:chExt cx="0" cy="0"/>
+        </a:xfrm>
+      </p:grpSpPr>
+      <p:sp>
+        <p:nvSpPr>
+          <p:cNvPr id="184" name="Shape 184"/>
+          <p:cNvSpPr txBox="1"/>
+          <p:nvPr>
+            <p:ph type="title"/>
+          </p:nvPr>
+        </p:nvSpPr>
+        <p:spPr>
+          <a:xfrm>
+            <a:off x="457200" y="205978"/>
+            <a:ext cx="8229600" cy="857400"/>
+          </a:xfrm>
+          <a:prstGeom prst="rect">
+            <a:avLst/>
+          </a:prstGeom>
+        </p:spPr>
+        <p:txBody>
+          <a:bodyPr anchorCtr="0" anchor="b" bIns="91425" lIns="91425" rIns="91425" tIns="91425">
+            <a:noAutofit/>
+          </a:bodyPr>
+          <a:lstStyle/>
+          <a:p>
+            <a:pPr>
+              <a:spcBef>
+                <a:spcPts val="0"/>
+              </a:spcBef>
+              <a:buNone/>
+            </a:pPr>
+            <a:r>
+              <a:rPr lang="en"/>
+              <a:t>PhysX</a:t>
+            </a:r>
+          </a:p>
+        </p:txBody>
+      </p:sp>
+      <p:sp>
+        <p:nvSpPr>
+          <p:cNvPr id="185" name="Shape 185"/>
+          <p:cNvSpPr txBox="1"/>
+          <p:nvPr>
+            <p:ph idx="1" type="body"/>
+          </p:nvPr>
+        </p:nvSpPr>
+        <p:spPr>
+          <a:xfrm>
+            <a:off x="457200" y="1200150"/>
+            <a:ext cx="8229600" cy="3725699"/>
+          </a:xfrm>
+          <a:prstGeom prst="rect">
+            <a:avLst/>
+          </a:prstGeom>
+        </p:spPr>
+        <p:txBody>
+          <a:bodyPr anchorCtr="0" anchor="t" bIns="91425" lIns="91425" rIns="91425" tIns="91425">
+            <a:noAutofit/>
+          </a:bodyPr>
+          <a:lstStyle/>
+          <a:p>
+            <a:pPr lvl="0" rtl="0">
+              <a:spcBef>
+                <a:spcPts val="0"/>
+              </a:spcBef>
+              <a:buClr>
+                <a:schemeClr val="dk1"/>
+              </a:buClr>
+              <a:buSzPct val="36666"/>
+              <a:buFont typeface="Arial"/>
+              <a:buNone/>
+            </a:pPr>
+            <a:r>
+              <a:rPr lang="en"/>
+              <a:t>Key Features</a:t>
+            </a:r>
+          </a:p>
+          <a:p>
+            <a:pPr indent="-419100" lvl="0" marL="457200" rtl="0">
+              <a:spcBef>
+                <a:spcPts val="0"/>
+              </a:spcBef>
+              <a:buClr>
+                <a:schemeClr val="dk1"/>
+              </a:buClr>
+              <a:buSzPct val="100000"/>
+              <a:buFont typeface="Arial"/>
+              <a:buChar char="●"/>
+            </a:pPr>
+            <a:r>
+              <a:rPr lang="en"/>
+              <a:t>Rigid Body Simulation</a:t>
+            </a:r>
+          </a:p>
+          <a:p>
+            <a:pPr indent="-419100" lvl="0" marL="457200" rtl="0">
+              <a:spcBef>
+                <a:spcPts val="0"/>
+              </a:spcBef>
+              <a:buClr>
+                <a:schemeClr val="dk1"/>
+              </a:buClr>
+              <a:buSzPct val="100000"/>
+              <a:buFont typeface="Arial"/>
+              <a:buChar char="●"/>
+            </a:pPr>
+            <a:r>
+              <a:rPr lang="en"/>
+              <a:t>Collision Detection</a:t>
+            </a:r>
+          </a:p>
+          <a:p>
+            <a:pPr indent="-419100" lvl="0" marL="457200" rtl="0">
+              <a:spcBef>
+                <a:spcPts val="0"/>
+              </a:spcBef>
+              <a:buClr>
+                <a:schemeClr val="dk1"/>
+              </a:buClr>
+              <a:buSzPct val="100000"/>
+              <a:buFont typeface="Arial"/>
+              <a:buChar char="●"/>
+            </a:pPr>
+            <a:r>
+              <a:rPr lang="en"/>
+              <a:t>Character Controller</a:t>
+            </a:r>
+          </a:p>
+          <a:p>
+            <a:pPr indent="-419100" lvl="0" marL="457200" rtl="0">
+              <a:spcBef>
+                <a:spcPts val="0"/>
+              </a:spcBef>
+              <a:buClr>
+                <a:schemeClr val="dk1"/>
+              </a:buClr>
+              <a:buSzPct val="100000"/>
+              <a:buFont typeface="Arial"/>
+              <a:buChar char="●"/>
+            </a:pPr>
+            <a:r>
+              <a:rPr lang="en"/>
+              <a:t>Particles</a:t>
+            </a:r>
+          </a:p>
+          <a:p>
+            <a:pPr indent="-419100" lvl="0" marL="457200" rtl="0">
+              <a:spcBef>
+                <a:spcPts val="0"/>
+              </a:spcBef>
+              <a:buClr>
+                <a:schemeClr val="dk1"/>
+              </a:buClr>
+              <a:buSzPct val="100000"/>
+              <a:buFont typeface="Arial"/>
+              <a:buChar char="●"/>
+            </a:pPr>
+            <a:r>
+              <a:rPr lang="en"/>
+              <a:t>Vehicles</a:t>
+            </a:r>
+          </a:p>
+          <a:p>
+            <a:pPr indent="-419100" lvl="0" marL="457200" rtl="0">
+              <a:spcBef>
+                <a:spcPts val="0"/>
+              </a:spcBef>
+              <a:buClr>
+                <a:schemeClr val="dk1"/>
+              </a:buClr>
+              <a:buSzPct val="100000"/>
+              <a:buFont typeface="Arial"/>
+              <a:buChar char="●"/>
+            </a:pPr>
+            <a:r>
+              <a:rPr lang="en"/>
+              <a:t>Cloth</a:t>
+            </a:r>
+          </a:p>
+          <a:p>
+            <a:pPr>
+              <a:spcBef>
+                <a:spcPts val="0"/>
+              </a:spcBef>
+              <a:buNone/>
+            </a:pPr>
+            <a:r>
+              <a:t/>
+            </a:r>
+            <a:endParaRPr/>
+          </a:p>
+        </p:txBody>
+      </p:sp>
+    </p:spTree>
+  </p:cSld>
+  <p:clrMapOvr>
+    <a:masterClrMapping/>
+  </p:clrMapOvr>
+  <p:transition spd="slow">
+    <p:cut/>
+  </p:transition>
+</p:sld>
+</file>
+
+<file path=ppt/slides/slide25.xml><?xml version="1.0" encoding="utf-8"?>
+<p:sld xmlns:a="http://schemas.openxmlformats.org/drawingml/2006/main" xmlns:r="http://schemas.openxmlformats.org/officeDocument/2006/relationships" xmlns:mc="http://schemas.openxmlformats.org/markup-compatibility/2006" xmlns:mv="urn:schemas-microsoft-com:mac:vml" xmlns:p="http://schemas.openxmlformats.org/presentationml/2006/main" xmlns:c="http://schemas.openxmlformats.org/drawingml/2006/chart" xmlns:dgm="http://schemas.openxmlformats.org/drawingml/2006/diagram" xmlns:o="urn:schemas-microsoft-com:office:office" xmlns:v="urn:schemas-microsoft-com:vml" xmlns:pvml="urn:schemas-microsoft-com:office:powerpoint" xmlns:com="http://schemas.openxmlformats.org/drawingml/2006/compatibility" xmlns:p14="http://schemas.microsoft.com/office/powerpoint/2010/main">
+  <p:cSld>
+    <p:spTree>
+      <p:nvGrpSpPr>
+        <p:cNvPr id="189" name="Shape 189"/>
+        <p:cNvGrpSpPr/>
+        <p:nvPr/>
+      </p:nvGrpSpPr>
+      <p:grpSpPr>
+        <a:xfrm>
+          <a:off x="0" y="0"/>
+          <a:ext cx="0" cy="0"/>
+          <a:chOff x="0" y="0"/>
+          <a:chExt cx="0" cy="0"/>
+        </a:xfrm>
+      </p:grpSpPr>
+      <p:sp>
+        <p:nvSpPr>
+          <p:cNvPr id="190" name="Shape 190"/>
+          <p:cNvSpPr txBox="1"/>
+          <p:nvPr>
+            <p:ph type="title"/>
+          </p:nvPr>
+        </p:nvSpPr>
+        <p:spPr>
+          <a:xfrm>
+            <a:off x="457200" y="205978"/>
+            <a:ext cx="8229600" cy="857400"/>
+          </a:xfrm>
+          <a:prstGeom prst="rect">
+            <a:avLst/>
+          </a:prstGeom>
+        </p:spPr>
+        <p:txBody>
+          <a:bodyPr anchorCtr="0" anchor="b" bIns="91425" lIns="91425" rIns="91425" tIns="91425">
+            <a:noAutofit/>
+          </a:bodyPr>
+          <a:lstStyle/>
+          <a:p>
+            <a:pPr>
+              <a:spcBef>
+                <a:spcPts val="0"/>
+              </a:spcBef>
+              <a:buNone/>
+            </a:pPr>
+            <a:r>
+              <a:rPr lang="en"/>
+              <a:t>Questions?</a:t>
+            </a:r>
+          </a:p>
+        </p:txBody>
+      </p:sp>
+      <p:sp>
+        <p:nvSpPr>
+          <p:cNvPr id="191" name="Shape 191"/>
+          <p:cNvSpPr txBox="1"/>
+          <p:nvPr>
+            <p:ph idx="1" type="body"/>
+          </p:nvPr>
+        </p:nvSpPr>
+        <p:spPr>
+          <a:xfrm>
+            <a:off x="457200" y="1200150"/>
+            <a:ext cx="8229600" cy="3725699"/>
+          </a:xfrm>
+          <a:prstGeom prst="rect">
+            <a:avLst/>
+          </a:prstGeom>
+        </p:spPr>
+        <p:txBody>
+          <a:bodyPr anchorCtr="0" anchor="t" bIns="91425" lIns="91425" rIns="91425" tIns="91425">
+            <a:noAutofit/>
+          </a:bodyPr>
+          <a:lstStyle/>
+          <a:p>
+            <a:pPr rtl="0" algn="ctr">
+              <a:spcBef>
+                <a:spcPts val="0"/>
+              </a:spcBef>
+              <a:buNone/>
+            </a:pPr>
+            <a:r>
+              <a:t/>
+            </a:r>
+            <a:endParaRPr/>
+          </a:p>
+          <a:p>
+            <a:pPr rtl="0" algn="ctr">
+              <a:spcBef>
+                <a:spcPts val="0"/>
+              </a:spcBef>
+              <a:buNone/>
+            </a:pPr>
+            <a:r>
+              <a:t/>
+            </a:r>
+            <a:endParaRPr/>
+          </a:p>
+          <a:p>
+            <a:pPr rtl="0" algn="ctr">
+              <a:spcBef>
+                <a:spcPts val="0"/>
+              </a:spcBef>
+              <a:buNone/>
+            </a:pPr>
+            <a:r>
+              <a:rPr lang="en"/>
+              <a:t>All code and these slides are available at:</a:t>
+            </a:r>
+          </a:p>
+          <a:p>
+            <a:pPr rtl="0" algn="ctr">
+              <a:spcBef>
+                <a:spcPts val="0"/>
+              </a:spcBef>
+              <a:buNone/>
+            </a:pPr>
+            <a:r>
+              <a:rPr lang="en" sz="2400" u="sng">
+                <a:solidFill>
+                  <a:schemeClr val="hlink"/>
+                </a:solidFill>
+                <a:hlinkClick r:id="rId3"/>
+              </a:rPr>
+              <a:t>https://github.com/BenjaminNitschke/PhysicsCourse</a:t>
+            </a:r>
+          </a:p>
+          <a:p>
+            <a:pPr algn="ctr">
+              <a:spcBef>
+                <a:spcPts val="0"/>
+              </a:spcBef>
+              <a:buNone/>
+            </a:pPr>
+            <a:r>
+              <a:t/>
+            </a:r>
+            <a:endParaRPr sz="2400"/>
+          </a:p>
+        </p:txBody>
+      </p:sp>
+    </p:spTree>
+  </p:cSld>
+  <p:clrMapOvr>
+    <a:masterClrMapping/>
+  </p:clrMapOvr>
+  <p:transition spd="slow">
+    <p:cut/>
+  </p:transition>
+</p:sld>
+</file>
+
+<file path=ppt/slides/slide26.xml><?xml version="1.0" encoding="utf-8"?>
+<p:sld xmlns:a="http://schemas.openxmlformats.org/drawingml/2006/main" xmlns:r="http://schemas.openxmlformats.org/officeDocument/2006/relationships" xmlns:mc="http://schemas.openxmlformats.org/markup-compatibility/2006" xmlns:mv="urn:schemas-microsoft-com:mac:vml" xmlns:p="http://schemas.openxmlformats.org/presentationml/2006/main" xmlns:c="http://schemas.openxmlformats.org/drawingml/2006/chart" xmlns:dgm="http://schemas.openxmlformats.org/drawingml/2006/diagram" xmlns:o="urn:schemas-microsoft-com:office:office" xmlns:v="urn:schemas-microsoft-com:vml" xmlns:pvml="urn:schemas-microsoft-com:office:powerpoint" xmlns:com="http://schemas.openxmlformats.org/drawingml/2006/compatibility" xmlns:p14="http://schemas.microsoft.com/office/powerpoint/2010/main">
+  <p:cSld>
+    <p:spTree>
+      <p:nvGrpSpPr>
+        <p:cNvPr id="195" name="Shape 195"/>
+        <p:cNvGrpSpPr/>
+        <p:nvPr/>
+      </p:nvGrpSpPr>
+      <p:grpSpPr>
+        <a:xfrm>
+          <a:off x="0" y="0"/>
+          <a:ext cx="0" cy="0"/>
+          <a:chOff x="0" y="0"/>
+          <a:chExt cx="0" cy="0"/>
+        </a:xfrm>
+      </p:grpSpPr>
+      <p:sp>
+        <p:nvSpPr>
+          <p:cNvPr id="196" name="Shape 196"/>
+          <p:cNvSpPr txBox="1"/>
+          <p:nvPr>
+            <p:ph type="title"/>
+          </p:nvPr>
+        </p:nvSpPr>
+        <p:spPr>
+          <a:xfrm>
+            <a:off x="457200" y="205978"/>
+            <a:ext cx="8229600" cy="857400"/>
+          </a:xfrm>
+          <a:prstGeom prst="rect">
+            <a:avLst/>
+          </a:prstGeom>
+        </p:spPr>
+        <p:txBody>
+          <a:bodyPr anchorCtr="0" anchor="b" bIns="91425" lIns="91425" rIns="91425" tIns="91425">
+            <a:noAutofit/>
+          </a:bodyPr>
+          <a:lstStyle/>
+          <a:p>
+            <a:pPr>
+              <a:spcBef>
+                <a:spcPts val="0"/>
+              </a:spcBef>
+              <a:buNone/>
+            </a:pPr>
+            <a:r>
+              <a:rPr lang="en"/>
+              <a:t>Books</a:t>
+            </a:r>
+          </a:p>
+        </p:txBody>
+      </p:sp>
+      <p:sp>
+        <p:nvSpPr>
+          <p:cNvPr id="197" name="Shape 197"/>
+          <p:cNvSpPr txBox="1"/>
+          <p:nvPr>
+            <p:ph idx="1" type="body"/>
+          </p:nvPr>
+        </p:nvSpPr>
+        <p:spPr>
+          <a:xfrm>
+            <a:off x="457200" y="1200150"/>
+            <a:ext cx="8229600" cy="3725699"/>
+          </a:xfrm>
+          <a:prstGeom prst="rect">
+            <a:avLst/>
+          </a:prstGeom>
+        </p:spPr>
+        <p:txBody>
+          <a:bodyPr anchorCtr="0" anchor="t" bIns="91425" lIns="91425" rIns="91425" tIns="91425">
+            <a:noAutofit/>
+          </a:bodyPr>
+          <a:lstStyle/>
+          <a:p>
+            <a:pPr indent="-419100" lvl="0" marL="457200" rtl="0">
+              <a:spcBef>
+                <a:spcPts val="0"/>
+              </a:spcBef>
+              <a:buClr>
+                <a:schemeClr val="dk1"/>
+              </a:buClr>
+              <a:buSzPct val="100000"/>
+              <a:buFont typeface="Arial"/>
+              <a:buChar char="●"/>
+            </a:pPr>
+            <a:r>
+              <a:rPr lang="en"/>
+              <a:t>Physics for Game Developers (2003 - classic book, still relevant, by David M. Bourg)</a:t>
+            </a:r>
+          </a:p>
+          <a:p>
+            <a:pPr indent="-419100" lvl="0" marL="457200" rtl="0">
+              <a:spcBef>
+                <a:spcPts val="0"/>
+              </a:spcBef>
+              <a:buClr>
+                <a:schemeClr val="dk1"/>
+              </a:buClr>
+              <a:buSzPct val="100000"/>
+              <a:buFont typeface="Arial"/>
+              <a:buChar char="●"/>
+            </a:pPr>
+            <a:r>
+              <a:rPr lang="en"/>
+              <a:t>Game Coding Complete - Forth Edition (2013, by Mike McShaffry and David Graham)</a:t>
+            </a:r>
+          </a:p>
+          <a:p>
+            <a:pPr indent="-419100" lvl="0" marL="457200" rtl="0">
+              <a:spcBef>
+                <a:spcPts val="0"/>
+              </a:spcBef>
+              <a:buClr>
+                <a:schemeClr val="dk1"/>
+              </a:buClr>
+              <a:buSzPct val="100000"/>
+              <a:buFont typeface="Arial"/>
+              <a:buChar char="●"/>
+            </a:pPr>
+            <a:r>
+              <a:rPr lang="en"/>
+              <a:t>Game Programming Gems 1-8 (Physics Chapters)</a:t>
+            </a:r>
+          </a:p>
+        </p:txBody>
+      </p:sp>
+    </p:spTree>
+  </p:cSld>
+  <p:clrMapOvr>
+    <a:masterClrMapping/>
+  </p:clrMapOvr>
+  <p:transition spd="slow">
+    <p:cut/>
+  </p:transition>
+</p:sld>
+</file>
+
+<file path=ppt/slides/slide27.xml><?xml version="1.0" encoding="utf-8"?>
+<p:sld xmlns:a="http://schemas.openxmlformats.org/drawingml/2006/main" xmlns:r="http://schemas.openxmlformats.org/officeDocument/2006/relationships" xmlns:mc="http://schemas.openxmlformats.org/markup-compatibility/2006" xmlns:mv="urn:schemas-microsoft-com:mac:vml" xmlns:p="http://schemas.openxmlformats.org/presentationml/2006/main" xmlns:c="http://schemas.openxmlformats.org/drawingml/2006/chart" xmlns:dgm="http://schemas.openxmlformats.org/drawingml/2006/diagram" xmlns:o="urn:schemas-microsoft-com:office:office" xmlns:v="urn:schemas-microsoft-com:vml" xmlns:pvml="urn:schemas-microsoft-com:office:powerpoint" xmlns:com="http://schemas.openxmlformats.org/drawingml/2006/compatibility" xmlns:p14="http://schemas.microsoft.com/office/powerpoint/2010/main">
+  <p:cSld>
+    <p:spTree>
+      <p:nvGrpSpPr>
+        <p:cNvPr id="201" name="Shape 201"/>
+        <p:cNvGrpSpPr/>
+        <p:nvPr/>
+      </p:nvGrpSpPr>
+      <p:grpSpPr>
+        <a:xfrm>
+          <a:off x="0" y="0"/>
+          <a:ext cx="0" cy="0"/>
+          <a:chOff x="0" y="0"/>
+          <a:chExt cx="0" cy="0"/>
+        </a:xfrm>
+      </p:grpSpPr>
+      <p:sp>
+        <p:nvSpPr>
+          <p:cNvPr id="202" name="Shape 202"/>
+          <p:cNvSpPr txBox="1"/>
+          <p:nvPr>
+            <p:ph type="title"/>
+          </p:nvPr>
+        </p:nvSpPr>
+        <p:spPr>
+          <a:xfrm>
+            <a:off x="457200" y="205978"/>
+            <a:ext cx="8229600" cy="857400"/>
+          </a:xfrm>
+          <a:prstGeom prst="rect">
+            <a:avLst/>
+          </a:prstGeom>
+        </p:spPr>
+        <p:txBody>
+          <a:bodyPr anchorCtr="0" anchor="b" bIns="91425" lIns="91425" rIns="91425" tIns="91425">
+            <a:noAutofit/>
+          </a:bodyPr>
+          <a:lstStyle/>
+          <a:p>
+            <a:pPr>
+              <a:spcBef>
+                <a:spcPts val="0"/>
+              </a:spcBef>
+              <a:buNone/>
+            </a:pPr>
+            <a:r>
+              <a:rPr lang="en"/>
+              <a:t>Physics Development Links</a:t>
+            </a:r>
+          </a:p>
+        </p:txBody>
+      </p:sp>
+      <p:sp>
+        <p:nvSpPr>
+          <p:cNvPr id="203" name="Shape 203"/>
+          <p:cNvSpPr txBox="1"/>
+          <p:nvPr>
+            <p:ph idx="1" type="body"/>
+          </p:nvPr>
+        </p:nvSpPr>
+        <p:spPr>
+          <a:xfrm>
+            <a:off x="457200" y="1200150"/>
+            <a:ext cx="8229600" cy="3725699"/>
+          </a:xfrm>
+          <a:prstGeom prst="rect">
+            <a:avLst/>
+          </a:prstGeom>
+        </p:spPr>
+        <p:txBody>
+          <a:bodyPr anchorCtr="0" anchor="t" bIns="91425" lIns="91425" rIns="91425" tIns="91425">
+            <a:noAutofit/>
+          </a:bodyPr>
+          <a:lstStyle/>
+          <a:p>
+            <a:pPr indent="-419100" lvl="0" marL="457200" rtl="0">
+              <a:spcBef>
+                <a:spcPts val="0"/>
+              </a:spcBef>
+              <a:buClr>
+                <a:schemeClr val="dk1"/>
+              </a:buClr>
+              <a:buSzPct val="100000"/>
+              <a:buFont typeface="Arial"/>
+              <a:buChar char="●"/>
+            </a:pPr>
+            <a:r>
+              <a:rPr lang="en" u="sng">
+                <a:solidFill>
+                  <a:schemeClr val="hlink"/>
+                </a:solidFill>
+                <a:hlinkClick r:id="rId3"/>
+              </a:rPr>
+              <a:t>http://box2d.org/</a:t>
+            </a:r>
+          </a:p>
+          <a:p>
+            <a:pPr indent="-419100" lvl="0" marL="457200" rtl="0">
+              <a:spcBef>
+                <a:spcPts val="0"/>
+              </a:spcBef>
+              <a:buClr>
+                <a:schemeClr val="dk1"/>
+              </a:buClr>
+              <a:buSzPct val="100000"/>
+              <a:buFont typeface="Arial"/>
+              <a:buChar char="●"/>
+            </a:pPr>
+            <a:r>
+              <a:rPr lang="en" u="sng">
+                <a:solidFill>
+                  <a:schemeClr val="hlink"/>
+                </a:solidFill>
+                <a:hlinkClick r:id="rId4"/>
+              </a:rPr>
+              <a:t>https://farseerphysics.codeplex.com/</a:t>
+            </a:r>
+          </a:p>
+          <a:p>
+            <a:pPr indent="-419100" lvl="0" marL="457200" rtl="0">
+              <a:spcBef>
+                <a:spcPts val="0"/>
+              </a:spcBef>
+              <a:buClr>
+                <a:schemeClr val="dk1"/>
+              </a:buClr>
+              <a:buSzPct val="100000"/>
+              <a:buFont typeface="Arial"/>
+              <a:buChar char="●"/>
+            </a:pPr>
+            <a:r>
+              <a:rPr lang="en" u="sng">
+                <a:solidFill>
+                  <a:schemeClr val="hlink"/>
+                </a:solidFill>
+                <a:hlinkClick r:id="rId5"/>
+              </a:rPr>
+              <a:t>https://en.wikipedia.org/wiki/Physics_engine</a:t>
+            </a:r>
+          </a:p>
+          <a:p>
+            <a:pPr indent="-419100" lvl="0" marL="457200" rtl="0">
+              <a:spcBef>
+                <a:spcPts val="0"/>
+              </a:spcBef>
+              <a:buClr>
+                <a:schemeClr val="dk1"/>
+              </a:buClr>
+              <a:buSzPct val="100000"/>
+              <a:buFont typeface="Arial"/>
+              <a:buChar char="●"/>
+            </a:pPr>
+            <a:r>
+              <a:rPr lang="en" u="sng">
+                <a:solidFill>
+                  <a:schemeClr val="hlink"/>
+                </a:solidFill>
+                <a:hlinkClick r:id="rId6"/>
+              </a:rPr>
+              <a:t>http://jitter-physics.com/wordpress/</a:t>
+            </a:r>
+          </a:p>
+          <a:p>
+            <a:pPr indent="-419100" lvl="0" marL="457200" rtl="0">
+              <a:spcBef>
+                <a:spcPts val="0"/>
+              </a:spcBef>
+              <a:buClr>
+                <a:schemeClr val="dk1"/>
+              </a:buClr>
+              <a:buSzPct val="100000"/>
+              <a:buFont typeface="Arial"/>
+              <a:buChar char="●"/>
+            </a:pPr>
+            <a:r>
+              <a:rPr lang="en" u="sng">
+                <a:solidFill>
+                  <a:schemeClr val="hlink"/>
+                </a:solidFill>
+                <a:hlinkClick r:id="rId7"/>
+              </a:rPr>
+              <a:t>http://bulletphysics.org/wordpress/</a:t>
+            </a:r>
+          </a:p>
+          <a:p>
+            <a:pPr indent="-419100" lvl="0" marL="457200" rtl="0">
+              <a:spcBef>
+                <a:spcPts val="0"/>
+              </a:spcBef>
+              <a:buClr>
+                <a:schemeClr val="dk1"/>
+              </a:buClr>
+              <a:buSzPct val="100000"/>
+              <a:buFont typeface="Arial"/>
+              <a:buChar char="●"/>
+            </a:pPr>
+            <a:r>
+              <a:rPr lang="en" u="sng">
+                <a:solidFill>
+                  <a:schemeClr val="hlink"/>
+                </a:solidFill>
+                <a:hlinkClick r:id="rId8"/>
+              </a:rPr>
+              <a:t>http://havok.com/physics</a:t>
+            </a:r>
+          </a:p>
+          <a:p>
+            <a:pPr indent="-419100" lvl="0" marL="457200" rtl="0">
+              <a:spcBef>
+                <a:spcPts val="0"/>
+              </a:spcBef>
+              <a:buClr>
+                <a:schemeClr val="dk1"/>
+              </a:buClr>
+              <a:buSzPct val="100000"/>
+              <a:buFont typeface="Arial"/>
+              <a:buChar char="●"/>
+            </a:pPr>
+            <a:r>
+              <a:rPr lang="en" u="sng">
+                <a:solidFill>
+                  <a:schemeClr val="hlink"/>
+                </a:solidFill>
+                <a:hlinkClick r:id="rId9"/>
+              </a:rPr>
+              <a:t>https://developer.nvidia.com/physx-sdk</a:t>
+            </a:r>
+          </a:p>
+        </p:txBody>
+      </p:sp>
     </p:spTree>
   </p:cSld>
   <p:clrMapOvr>

</xml_diff>